<commit_message>
Added patch occupancy model schematic
</commit_message>
<xml_diff>
--- a/PatchOccupancy_Sims/SimulationModel.pptx
+++ b/PatchOccupancy_Sims/SimulationModel.pptx
@@ -3095,6 +3095,1456 @@
           <a:chExt cx="0" cy="0"/>
         </a:xfrm>
       </p:grpSpPr>
+      <p:sp>
+        <p:nvSpPr>
+          <p:cNvPr id="84" name="Rectangle 83"/>
+          <p:cNvSpPr/>
+          <p:nvPr/>
+        </p:nvSpPr>
+        <p:spPr>
+          <a:xfrm>
+            <a:off x="6617514" y="-805"/>
+            <a:ext cx="2526487" cy="1849865"/>
+          </a:xfrm>
+          <a:prstGeom prst="rect">
+            <a:avLst/>
+          </a:prstGeom>
+          <a:noFill/>
+        </p:spPr>
+        <p:style>
+          <a:lnRef idx="2">
+            <a:schemeClr val="dk1"/>
+          </a:lnRef>
+          <a:fillRef idx="1">
+            <a:schemeClr val="lt1"/>
+          </a:fillRef>
+          <a:effectRef idx="0">
+            <a:schemeClr val="dk1"/>
+          </a:effectRef>
+          <a:fontRef idx="minor">
+            <a:schemeClr val="dk1"/>
+          </a:fontRef>
+        </p:style>
+        <p:txBody>
+          <a:bodyPr rtlCol="0" anchor="ctr"/>
+          <a:lstStyle/>
+          <a:p>
+            <a:pPr algn="ctr"/>
+            <a:endParaRPr lang="en-US"/>
+          </a:p>
+        </p:txBody>
+      </p:sp>
+      <p:sp>
+        <p:nvSpPr>
+          <p:cNvPr id="7" name="Rectangle 6"/>
+          <p:cNvSpPr/>
+          <p:nvPr/>
+        </p:nvSpPr>
+        <p:spPr>
+          <a:xfrm>
+            <a:off x="362382" y="4314630"/>
+            <a:ext cx="872847" cy="883845"/>
+          </a:xfrm>
+          <a:prstGeom prst="rect">
+            <a:avLst/>
+          </a:prstGeom>
+          <a:solidFill>
+            <a:schemeClr val="accent5">
+              <a:lumMod val="60000"/>
+              <a:lumOff val="40000"/>
+            </a:schemeClr>
+          </a:solidFill>
+          <a:ln>
+            <a:solidFill>
+              <a:schemeClr val="tx1"/>
+            </a:solidFill>
+          </a:ln>
+        </p:spPr>
+        <p:style>
+          <a:lnRef idx="2">
+            <a:schemeClr val="accent6"/>
+          </a:lnRef>
+          <a:fillRef idx="1">
+            <a:schemeClr val="lt1"/>
+          </a:fillRef>
+          <a:effectRef idx="0">
+            <a:schemeClr val="accent6"/>
+          </a:effectRef>
+          <a:fontRef idx="minor">
+            <a:schemeClr val="dk1"/>
+          </a:fontRef>
+        </p:style>
+        <p:txBody>
+          <a:bodyPr rot="0" spcFirstLastPara="0" vert="horz" wrap="square" lIns="0" tIns="45720" rIns="0" bIns="45720" numCol="1" spcCol="0" rtlCol="0" fromWordArt="0" anchor="ctr" anchorCtr="0" forceAA="0" compatLnSpc="1">
+            <a:prstTxWarp prst="textNoShape">
+              <a:avLst/>
+            </a:prstTxWarp>
+            <a:noAutofit/>
+          </a:bodyPr>
+          <a:lstStyle/>
+          <a:p>
+            <a:pPr marL="0" marR="0" algn="ctr">
+              <a:lnSpc>
+                <a:spcPct val="115000"/>
+              </a:lnSpc>
+              <a:spcBef>
+                <a:spcPts val="0"/>
+              </a:spcBef>
+              <a:spcAft>
+                <a:spcPts val="1000"/>
+              </a:spcAft>
+            </a:pPr>
+            <a:r>
+              <a:rPr lang="en-US" sz="2000" b="1" dirty="0" smtClean="0">
+                <a:effectLst/>
+                <a:ea typeface="Calibri"/>
+              </a:rPr>
+              <a:t>Pop 1</a:t>
+            </a:r>
+            <a:endParaRPr lang="en-US" sz="1200" dirty="0">
+              <a:effectLst/>
+              <a:latin typeface="Times New Roman"/>
+              <a:ea typeface="ＭＳ 明朝"/>
+            </a:endParaRPr>
+          </a:p>
+        </p:txBody>
+      </p:sp>
+      <p:sp>
+        <p:nvSpPr>
+          <p:cNvPr id="8" name="Rectangle 7"/>
+          <p:cNvSpPr/>
+          <p:nvPr/>
+        </p:nvSpPr>
+        <p:spPr>
+          <a:xfrm>
+            <a:off x="821326" y="5811421"/>
+            <a:ext cx="793497" cy="730449"/>
+          </a:xfrm>
+          <a:prstGeom prst="rect">
+            <a:avLst/>
+          </a:prstGeom>
+          <a:solidFill>
+            <a:schemeClr val="tx1"/>
+          </a:solidFill>
+          <a:ln>
+            <a:solidFill>
+              <a:schemeClr val="tx1"/>
+            </a:solidFill>
+          </a:ln>
+        </p:spPr>
+        <p:style>
+          <a:lnRef idx="2">
+            <a:schemeClr val="accent6"/>
+          </a:lnRef>
+          <a:fillRef idx="1">
+            <a:schemeClr val="lt1"/>
+          </a:fillRef>
+          <a:effectRef idx="0">
+            <a:schemeClr val="accent6"/>
+          </a:effectRef>
+          <a:fontRef idx="minor">
+            <a:schemeClr val="dk1"/>
+          </a:fontRef>
+        </p:style>
+        <p:txBody>
+          <a:bodyPr rot="0" spcFirstLastPara="0" vert="horz" wrap="square" lIns="0" tIns="45720" rIns="0" bIns="45720" numCol="1" spcCol="0" rtlCol="0" fromWordArt="0" anchor="ctr" anchorCtr="0" forceAA="0" compatLnSpc="1">
+            <a:prstTxWarp prst="textNoShape">
+              <a:avLst/>
+            </a:prstTxWarp>
+            <a:noAutofit/>
+          </a:bodyPr>
+          <a:lstStyle/>
+          <a:p>
+            <a:pPr marL="0" marR="0" algn="ctr">
+              <a:lnSpc>
+                <a:spcPct val="115000"/>
+              </a:lnSpc>
+              <a:spcBef>
+                <a:spcPts val="0"/>
+              </a:spcBef>
+              <a:spcAft>
+                <a:spcPts val="1000"/>
+              </a:spcAft>
+            </a:pPr>
+            <a:endParaRPr lang="en-US" sz="1200" dirty="0">
+              <a:effectLst/>
+              <a:latin typeface="Times New Roman"/>
+              <a:ea typeface="ＭＳ 明朝"/>
+            </a:endParaRPr>
+          </a:p>
+        </p:txBody>
+      </p:sp>
+      <p:sp>
+        <p:nvSpPr>
+          <p:cNvPr id="9" name="Rectangle 8"/>
+          <p:cNvSpPr/>
+          <p:nvPr/>
+        </p:nvSpPr>
+        <p:spPr>
+          <a:xfrm>
+            <a:off x="737783" y="3445243"/>
+            <a:ext cx="655783" cy="498906"/>
+          </a:xfrm>
+          <a:prstGeom prst="rect">
+            <a:avLst/>
+          </a:prstGeom>
+          <a:solidFill>
+            <a:schemeClr val="accent2">
+              <a:lumMod val="40000"/>
+              <a:lumOff val="60000"/>
+            </a:schemeClr>
+          </a:solidFill>
+          <a:ln>
+            <a:solidFill>
+              <a:schemeClr val="tx1"/>
+            </a:solidFill>
+          </a:ln>
+        </p:spPr>
+        <p:style>
+          <a:lnRef idx="2">
+            <a:schemeClr val="accent6"/>
+          </a:lnRef>
+          <a:fillRef idx="1">
+            <a:schemeClr val="lt1"/>
+          </a:fillRef>
+          <a:effectRef idx="0">
+            <a:schemeClr val="accent6"/>
+          </a:effectRef>
+          <a:fontRef idx="minor">
+            <a:schemeClr val="dk1"/>
+          </a:fontRef>
+        </p:style>
+        <p:txBody>
+          <a:bodyPr rot="0" spcFirstLastPara="0" vert="horz" wrap="square" lIns="0" tIns="45720" rIns="0" bIns="45720" numCol="1" spcCol="0" rtlCol="0" fromWordArt="0" anchor="ctr" anchorCtr="0" forceAA="0" compatLnSpc="1">
+            <a:prstTxWarp prst="textNoShape">
+              <a:avLst/>
+            </a:prstTxWarp>
+            <a:noAutofit/>
+          </a:bodyPr>
+          <a:lstStyle/>
+          <a:p>
+            <a:pPr marL="0" marR="0" algn="ctr">
+              <a:lnSpc>
+                <a:spcPct val="115000"/>
+              </a:lnSpc>
+              <a:spcBef>
+                <a:spcPts val="0"/>
+              </a:spcBef>
+              <a:spcAft>
+                <a:spcPts val="1000"/>
+              </a:spcAft>
+            </a:pPr>
+            <a:r>
+              <a:rPr lang="en-US" sz="2000" b="1" dirty="0" smtClean="0">
+                <a:effectLst/>
+                <a:ea typeface="Calibri"/>
+              </a:rPr>
+              <a:t>Pop 2</a:t>
+            </a:r>
+            <a:endParaRPr lang="en-US" sz="1200" dirty="0">
+              <a:effectLst/>
+              <a:latin typeface="Times New Roman"/>
+              <a:ea typeface="ＭＳ 明朝"/>
+            </a:endParaRPr>
+          </a:p>
+        </p:txBody>
+      </p:sp>
+      <p:sp>
+        <p:nvSpPr>
+          <p:cNvPr id="10" name="Rectangle 9"/>
+          <p:cNvSpPr/>
+          <p:nvPr/>
+        </p:nvSpPr>
+        <p:spPr>
+          <a:xfrm>
+            <a:off x="543093" y="1628536"/>
+            <a:ext cx="1405730" cy="1423439"/>
+          </a:xfrm>
+          <a:prstGeom prst="rect">
+            <a:avLst/>
+          </a:prstGeom>
+          <a:solidFill>
+            <a:schemeClr val="accent3">
+              <a:lumMod val="60000"/>
+              <a:lumOff val="40000"/>
+            </a:schemeClr>
+          </a:solidFill>
+          <a:ln>
+            <a:solidFill>
+              <a:schemeClr val="tx1"/>
+            </a:solidFill>
+          </a:ln>
+        </p:spPr>
+        <p:style>
+          <a:lnRef idx="2">
+            <a:schemeClr val="accent6"/>
+          </a:lnRef>
+          <a:fillRef idx="1">
+            <a:schemeClr val="lt1"/>
+          </a:fillRef>
+          <a:effectRef idx="0">
+            <a:schemeClr val="accent6"/>
+          </a:effectRef>
+          <a:fontRef idx="minor">
+            <a:schemeClr val="dk1"/>
+          </a:fontRef>
+        </p:style>
+        <p:txBody>
+          <a:bodyPr rot="0" spcFirstLastPara="0" vert="horz" wrap="square" lIns="0" tIns="45720" rIns="0" bIns="45720" numCol="1" spcCol="0" rtlCol="0" fromWordArt="0" anchor="ctr" anchorCtr="0" forceAA="0" compatLnSpc="1">
+            <a:prstTxWarp prst="textNoShape">
+              <a:avLst/>
+            </a:prstTxWarp>
+            <a:noAutofit/>
+          </a:bodyPr>
+          <a:lstStyle/>
+          <a:p>
+            <a:pPr marL="0" marR="0" algn="ctr">
+              <a:lnSpc>
+                <a:spcPct val="115000"/>
+              </a:lnSpc>
+              <a:spcBef>
+                <a:spcPts val="0"/>
+              </a:spcBef>
+              <a:spcAft>
+                <a:spcPts val="1000"/>
+              </a:spcAft>
+            </a:pPr>
+            <a:r>
+              <a:rPr lang="en-US" sz="2000" b="1" dirty="0" smtClean="0">
+                <a:effectLst/>
+                <a:ea typeface="Calibri"/>
+              </a:rPr>
+              <a:t>Pop 3</a:t>
+            </a:r>
+            <a:endParaRPr lang="en-US" sz="1200" dirty="0">
+              <a:effectLst/>
+              <a:latin typeface="Times New Roman"/>
+              <a:ea typeface="ＭＳ 明朝"/>
+            </a:endParaRPr>
+          </a:p>
+        </p:txBody>
+      </p:sp>
+      <p:cxnSp>
+        <p:nvCxnSpPr>
+          <p:cNvPr id="18" name="Straight Connector 17"/>
+          <p:cNvCxnSpPr>
+            <a:stCxn id="8" idx="3"/>
+            <a:endCxn id="5" idx="0"/>
+          </p:cNvCxnSpPr>
+          <p:nvPr/>
+        </p:nvCxnSpPr>
+        <p:spPr>
+          <a:xfrm flipV="1">
+            <a:off x="1614823" y="5381458"/>
+            <a:ext cx="2942746" cy="795188"/>
+          </a:xfrm>
+          <a:prstGeom prst="line">
+            <a:avLst/>
+          </a:prstGeom>
+          <a:ln>
+            <a:solidFill>
+              <a:srgbClr val="000000"/>
+            </a:solidFill>
+          </a:ln>
+        </p:spPr>
+        <p:style>
+          <a:lnRef idx="2">
+            <a:schemeClr val="accent1"/>
+          </a:lnRef>
+          <a:fillRef idx="0">
+            <a:schemeClr val="accent1"/>
+          </a:fillRef>
+          <a:effectRef idx="1">
+            <a:schemeClr val="accent1"/>
+          </a:effectRef>
+          <a:fontRef idx="minor">
+            <a:schemeClr val="tx1"/>
+          </a:fontRef>
+        </p:style>
+      </p:cxnSp>
+      <p:cxnSp>
+        <p:nvCxnSpPr>
+          <p:cNvPr id="21" name="Straight Connector 20"/>
+          <p:cNvCxnSpPr>
+            <a:stCxn id="7" idx="3"/>
+            <a:endCxn id="5" idx="0"/>
+          </p:cNvCxnSpPr>
+          <p:nvPr/>
+        </p:nvCxnSpPr>
+        <p:spPr>
+          <a:xfrm>
+            <a:off x="1235229" y="4756553"/>
+            <a:ext cx="3322340" cy="624905"/>
+          </a:xfrm>
+          <a:prstGeom prst="line">
+            <a:avLst/>
+          </a:prstGeom>
+          <a:ln>
+            <a:solidFill>
+              <a:srgbClr val="000000"/>
+            </a:solidFill>
+          </a:ln>
+        </p:spPr>
+        <p:style>
+          <a:lnRef idx="2">
+            <a:schemeClr val="accent1"/>
+          </a:lnRef>
+          <a:fillRef idx="0">
+            <a:schemeClr val="accent1"/>
+          </a:fillRef>
+          <a:effectRef idx="1">
+            <a:schemeClr val="accent1"/>
+          </a:effectRef>
+          <a:fontRef idx="minor">
+            <a:schemeClr val="tx1"/>
+          </a:fontRef>
+        </p:style>
+      </p:cxnSp>
+      <p:cxnSp>
+        <p:nvCxnSpPr>
+          <p:cNvPr id="24" name="Straight Connector 23"/>
+          <p:cNvCxnSpPr>
+            <a:stCxn id="9" idx="3"/>
+            <a:endCxn id="5" idx="0"/>
+          </p:cNvCxnSpPr>
+          <p:nvPr/>
+        </p:nvCxnSpPr>
+        <p:spPr>
+          <a:xfrm>
+            <a:off x="1393566" y="3694696"/>
+            <a:ext cx="3164003" cy="1686762"/>
+          </a:xfrm>
+          <a:prstGeom prst="line">
+            <a:avLst/>
+          </a:prstGeom>
+          <a:ln>
+            <a:solidFill>
+              <a:srgbClr val="000000"/>
+            </a:solidFill>
+          </a:ln>
+        </p:spPr>
+        <p:style>
+          <a:lnRef idx="2">
+            <a:schemeClr val="accent1"/>
+          </a:lnRef>
+          <a:fillRef idx="0">
+            <a:schemeClr val="accent1"/>
+          </a:fillRef>
+          <a:effectRef idx="1">
+            <a:schemeClr val="accent1"/>
+          </a:effectRef>
+          <a:fontRef idx="minor">
+            <a:schemeClr val="tx1"/>
+          </a:fontRef>
+        </p:style>
+      </p:cxnSp>
+      <p:cxnSp>
+        <p:nvCxnSpPr>
+          <p:cNvPr id="27" name="Straight Connector 26"/>
+          <p:cNvCxnSpPr>
+            <a:stCxn id="10" idx="3"/>
+            <a:endCxn id="5" idx="0"/>
+          </p:cNvCxnSpPr>
+          <p:nvPr/>
+        </p:nvCxnSpPr>
+        <p:spPr>
+          <a:xfrm>
+            <a:off x="1948823" y="2340256"/>
+            <a:ext cx="2608746" cy="3041202"/>
+          </a:xfrm>
+          <a:prstGeom prst="line">
+            <a:avLst/>
+          </a:prstGeom>
+          <a:ln>
+            <a:solidFill>
+              <a:srgbClr val="000000"/>
+            </a:solidFill>
+          </a:ln>
+        </p:spPr>
+        <p:style>
+          <a:lnRef idx="2">
+            <a:schemeClr val="accent1"/>
+          </a:lnRef>
+          <a:fillRef idx="0">
+            <a:schemeClr val="accent1"/>
+          </a:fillRef>
+          <a:effectRef idx="1">
+            <a:schemeClr val="accent1"/>
+          </a:effectRef>
+          <a:fontRef idx="minor">
+            <a:schemeClr val="tx1"/>
+          </a:fontRef>
+        </p:style>
+      </p:cxnSp>
+      <p:cxnSp>
+        <p:nvCxnSpPr>
+          <p:cNvPr id="30" name="Straight Connector 29"/>
+          <p:cNvCxnSpPr>
+            <a:stCxn id="60" idx="3"/>
+            <a:endCxn id="5" idx="0"/>
+          </p:cNvCxnSpPr>
+          <p:nvPr/>
+        </p:nvCxnSpPr>
+        <p:spPr>
+          <a:xfrm>
+            <a:off x="2466492" y="1323493"/>
+            <a:ext cx="2091077" cy="4057965"/>
+          </a:xfrm>
+          <a:prstGeom prst="line">
+            <a:avLst/>
+          </a:prstGeom>
+          <a:ln>
+            <a:solidFill>
+              <a:srgbClr val="000000"/>
+            </a:solidFill>
+          </a:ln>
+        </p:spPr>
+        <p:style>
+          <a:lnRef idx="2">
+            <a:schemeClr val="accent1"/>
+          </a:lnRef>
+          <a:fillRef idx="0">
+            <a:schemeClr val="accent1"/>
+          </a:fillRef>
+          <a:effectRef idx="1">
+            <a:schemeClr val="accent1"/>
+          </a:effectRef>
+          <a:fontRef idx="minor">
+            <a:schemeClr val="tx1"/>
+          </a:fontRef>
+        </p:style>
+      </p:cxnSp>
+      <p:cxnSp>
+        <p:nvCxnSpPr>
+          <p:cNvPr id="33" name="Straight Connector 32"/>
+          <p:cNvCxnSpPr>
+            <a:stCxn id="62" idx="3"/>
+            <a:endCxn id="5" idx="0"/>
+          </p:cNvCxnSpPr>
+          <p:nvPr/>
+        </p:nvCxnSpPr>
+        <p:spPr>
+          <a:xfrm>
+            <a:off x="3938153" y="891381"/>
+            <a:ext cx="619416" cy="4490077"/>
+          </a:xfrm>
+          <a:prstGeom prst="line">
+            <a:avLst/>
+          </a:prstGeom>
+          <a:ln>
+            <a:solidFill>
+              <a:srgbClr val="000000"/>
+            </a:solidFill>
+          </a:ln>
+        </p:spPr>
+        <p:style>
+          <a:lnRef idx="2">
+            <a:schemeClr val="accent1"/>
+          </a:lnRef>
+          <a:fillRef idx="0">
+            <a:schemeClr val="accent1"/>
+          </a:fillRef>
+          <a:effectRef idx="1">
+            <a:schemeClr val="accent1"/>
+          </a:effectRef>
+          <a:fontRef idx="minor">
+            <a:schemeClr val="tx1"/>
+          </a:fontRef>
+        </p:style>
+      </p:cxnSp>
+      <p:cxnSp>
+        <p:nvCxnSpPr>
+          <p:cNvPr id="36" name="Straight Connector 35"/>
+          <p:cNvCxnSpPr>
+            <a:stCxn id="64" idx="3"/>
+            <a:endCxn id="5" idx="0"/>
+          </p:cNvCxnSpPr>
+          <p:nvPr/>
+        </p:nvCxnSpPr>
+        <p:spPr>
+          <a:xfrm flipH="1">
+            <a:off x="4557569" y="1709762"/>
+            <a:ext cx="994909" cy="3671696"/>
+          </a:xfrm>
+          <a:prstGeom prst="line">
+            <a:avLst/>
+          </a:prstGeom>
+          <a:ln>
+            <a:solidFill>
+              <a:srgbClr val="000000"/>
+            </a:solidFill>
+          </a:ln>
+        </p:spPr>
+        <p:style>
+          <a:lnRef idx="2">
+            <a:schemeClr val="accent1"/>
+          </a:lnRef>
+          <a:fillRef idx="0">
+            <a:schemeClr val="accent1"/>
+          </a:fillRef>
+          <a:effectRef idx="1">
+            <a:schemeClr val="accent1"/>
+          </a:effectRef>
+          <a:fontRef idx="minor">
+            <a:schemeClr val="tx1"/>
+          </a:fontRef>
+        </p:style>
+      </p:cxnSp>
+      <p:cxnSp>
+        <p:nvCxnSpPr>
+          <p:cNvPr id="39" name="Straight Connector 38"/>
+          <p:cNvCxnSpPr>
+            <a:stCxn id="66" idx="2"/>
+            <a:endCxn id="5" idx="0"/>
+          </p:cNvCxnSpPr>
+          <p:nvPr/>
+        </p:nvCxnSpPr>
+        <p:spPr>
+          <a:xfrm flipH="1">
+            <a:off x="4557569" y="2936259"/>
+            <a:ext cx="2736133" cy="2445199"/>
+          </a:xfrm>
+          <a:prstGeom prst="line">
+            <a:avLst/>
+          </a:prstGeom>
+          <a:ln>
+            <a:solidFill>
+              <a:srgbClr val="000000"/>
+            </a:solidFill>
+          </a:ln>
+        </p:spPr>
+        <p:style>
+          <a:lnRef idx="2">
+            <a:schemeClr val="accent1"/>
+          </a:lnRef>
+          <a:fillRef idx="0">
+            <a:schemeClr val="accent1"/>
+          </a:fillRef>
+          <a:effectRef idx="1">
+            <a:schemeClr val="accent1"/>
+          </a:effectRef>
+          <a:fontRef idx="minor">
+            <a:schemeClr val="tx1"/>
+          </a:fontRef>
+        </p:style>
+      </p:cxnSp>
+      <p:cxnSp>
+        <p:nvCxnSpPr>
+          <p:cNvPr id="42" name="Straight Connector 41"/>
+          <p:cNvCxnSpPr>
+            <a:stCxn id="67" idx="2"/>
+            <a:endCxn id="6" idx="0"/>
+          </p:cNvCxnSpPr>
+          <p:nvPr/>
+        </p:nvCxnSpPr>
+        <p:spPr>
+          <a:xfrm flipH="1">
+            <a:off x="4571512" y="4163531"/>
+            <a:ext cx="3007071" cy="1246791"/>
+          </a:xfrm>
+          <a:prstGeom prst="line">
+            <a:avLst/>
+          </a:prstGeom>
+          <a:ln>
+            <a:solidFill>
+              <a:srgbClr val="000000"/>
+            </a:solidFill>
+          </a:ln>
+        </p:spPr>
+        <p:style>
+          <a:lnRef idx="2">
+            <a:schemeClr val="accent1"/>
+          </a:lnRef>
+          <a:fillRef idx="0">
+            <a:schemeClr val="accent1"/>
+          </a:fillRef>
+          <a:effectRef idx="1">
+            <a:schemeClr val="accent1"/>
+          </a:effectRef>
+          <a:fontRef idx="minor">
+            <a:schemeClr val="tx1"/>
+          </a:fontRef>
+        </p:style>
+      </p:cxnSp>
+      <p:cxnSp>
+        <p:nvCxnSpPr>
+          <p:cNvPr id="45" name="Straight Connector 44"/>
+          <p:cNvCxnSpPr>
+            <a:stCxn id="70" idx="2"/>
+            <a:endCxn id="5" idx="0"/>
+          </p:cNvCxnSpPr>
+          <p:nvPr/>
+        </p:nvCxnSpPr>
+        <p:spPr>
+          <a:xfrm flipH="1" flipV="1">
+            <a:off x="4557569" y="5381458"/>
+            <a:ext cx="2705705" cy="240895"/>
+          </a:xfrm>
+          <a:prstGeom prst="line">
+            <a:avLst/>
+          </a:prstGeom>
+          <a:ln>
+            <a:solidFill>
+              <a:srgbClr val="000000"/>
+            </a:solidFill>
+          </a:ln>
+        </p:spPr>
+        <p:style>
+          <a:lnRef idx="2">
+            <a:schemeClr val="accent1"/>
+          </a:lnRef>
+          <a:fillRef idx="0">
+            <a:schemeClr val="accent1"/>
+          </a:fillRef>
+          <a:effectRef idx="1">
+            <a:schemeClr val="accent1"/>
+          </a:effectRef>
+          <a:fontRef idx="minor">
+            <a:schemeClr val="tx1"/>
+          </a:fontRef>
+        </p:style>
+      </p:cxnSp>
+      <p:sp>
+        <p:nvSpPr>
+          <p:cNvPr id="60" name="Isosceles Triangle 59"/>
+          <p:cNvSpPr/>
+          <p:nvPr/>
+        </p:nvSpPr>
+        <p:spPr>
+          <a:xfrm>
+            <a:off x="1870642" y="314207"/>
+            <a:ext cx="1191700" cy="1009286"/>
+          </a:xfrm>
+          <a:prstGeom prst="triangle">
+            <a:avLst/>
+          </a:prstGeom>
+          <a:solidFill>
+            <a:schemeClr val="accent5">
+              <a:lumMod val="60000"/>
+              <a:lumOff val="40000"/>
+            </a:schemeClr>
+          </a:solidFill>
+          <a:ln>
+            <a:solidFill>
+              <a:schemeClr val="tx1"/>
+            </a:solidFill>
+          </a:ln>
+        </p:spPr>
+        <p:style>
+          <a:lnRef idx="2">
+            <a:schemeClr val="accent6"/>
+          </a:lnRef>
+          <a:fillRef idx="1">
+            <a:schemeClr val="lt1"/>
+          </a:fillRef>
+          <a:effectRef idx="0">
+            <a:schemeClr val="accent6"/>
+          </a:effectRef>
+          <a:fontRef idx="minor">
+            <a:schemeClr val="dk1"/>
+          </a:fontRef>
+        </p:style>
+        <p:txBody>
+          <a:bodyPr rot="0" spcFirstLastPara="0" vert="horz" wrap="square" lIns="0" tIns="45720" rIns="0" bIns="45720" numCol="1" spcCol="0" rtlCol="0" fromWordArt="0" anchor="ctr" anchorCtr="0" forceAA="0" compatLnSpc="1">
+            <a:prstTxWarp prst="textNoShape">
+              <a:avLst/>
+            </a:prstTxWarp>
+            <a:noAutofit/>
+          </a:bodyPr>
+          <a:lstStyle/>
+          <a:p>
+            <a:pPr algn="ctr">
+              <a:lnSpc>
+                <a:spcPct val="115000"/>
+              </a:lnSpc>
+              <a:spcAft>
+                <a:spcPts val="1000"/>
+              </a:spcAft>
+            </a:pPr>
+            <a:r>
+              <a:rPr lang="en-US" sz="2000" b="1" dirty="0" smtClean="0">
+                <a:solidFill>
+                  <a:schemeClr val="dk1"/>
+                </a:solidFill>
+                <a:ea typeface="Calibri"/>
+              </a:rPr>
+              <a:t>Pop 4</a:t>
+            </a:r>
+            <a:endParaRPr lang="en-US" sz="2000" b="1" dirty="0">
+              <a:solidFill>
+                <a:schemeClr val="dk1"/>
+              </a:solidFill>
+              <a:ea typeface="Calibri"/>
+            </a:endParaRPr>
+          </a:p>
+        </p:txBody>
+      </p:sp>
+      <p:sp>
+        <p:nvSpPr>
+          <p:cNvPr id="62" name="Isosceles Triangle 61"/>
+          <p:cNvSpPr/>
+          <p:nvPr/>
+        </p:nvSpPr>
+        <p:spPr>
+          <a:xfrm>
+            <a:off x="3342303" y="463346"/>
+            <a:ext cx="1191700" cy="428035"/>
+          </a:xfrm>
+          <a:prstGeom prst="triangle">
+            <a:avLst/>
+          </a:prstGeom>
+          <a:solidFill>
+            <a:schemeClr val="accent2">
+              <a:lumMod val="40000"/>
+              <a:lumOff val="60000"/>
+            </a:schemeClr>
+          </a:solidFill>
+          <a:ln>
+            <a:solidFill>
+              <a:schemeClr val="tx1"/>
+            </a:solidFill>
+          </a:ln>
+        </p:spPr>
+        <p:style>
+          <a:lnRef idx="2">
+            <a:schemeClr val="accent6"/>
+          </a:lnRef>
+          <a:fillRef idx="1">
+            <a:schemeClr val="lt1"/>
+          </a:fillRef>
+          <a:effectRef idx="0">
+            <a:schemeClr val="accent6"/>
+          </a:effectRef>
+          <a:fontRef idx="minor">
+            <a:schemeClr val="dk1"/>
+          </a:fontRef>
+        </p:style>
+        <p:txBody>
+          <a:bodyPr rot="0" spcFirstLastPara="0" vert="horz" wrap="square" lIns="0" tIns="45720" rIns="0" bIns="45720" numCol="1" spcCol="0" rtlCol="0" fromWordArt="0" anchor="ctr" anchorCtr="0" forceAA="0" compatLnSpc="1">
+            <a:prstTxWarp prst="textNoShape">
+              <a:avLst/>
+            </a:prstTxWarp>
+            <a:noAutofit/>
+          </a:bodyPr>
+          <a:lstStyle/>
+          <a:p>
+            <a:pPr algn="ctr">
+              <a:lnSpc>
+                <a:spcPct val="60000"/>
+              </a:lnSpc>
+              <a:spcAft>
+                <a:spcPts val="1000"/>
+              </a:spcAft>
+            </a:pPr>
+            <a:r>
+              <a:rPr lang="en-US" sz="2000" b="1" dirty="0">
+                <a:ea typeface="Calibri"/>
+              </a:rPr>
+              <a:t>Pop </a:t>
+            </a:r>
+            <a:r>
+              <a:rPr lang="en-US" sz="2000" b="1" dirty="0" smtClean="0">
+                <a:ea typeface="Calibri"/>
+              </a:rPr>
+              <a:t>5</a:t>
+            </a:r>
+            <a:endParaRPr lang="en-US" sz="2000" b="1" dirty="0">
+              <a:ea typeface="Calibri"/>
+            </a:endParaRPr>
+          </a:p>
+        </p:txBody>
+      </p:sp>
+      <p:sp>
+        <p:nvSpPr>
+          <p:cNvPr id="64" name="Isosceles Triangle 63"/>
+          <p:cNvSpPr/>
+          <p:nvPr/>
+        </p:nvSpPr>
+        <p:spPr>
+          <a:xfrm>
+            <a:off x="4592855" y="84295"/>
+            <a:ext cx="1919245" cy="1625467"/>
+          </a:xfrm>
+          <a:prstGeom prst="triangle">
+            <a:avLst/>
+          </a:prstGeom>
+          <a:solidFill>
+            <a:schemeClr val="accent3">
+              <a:lumMod val="60000"/>
+              <a:lumOff val="40000"/>
+            </a:schemeClr>
+          </a:solidFill>
+          <a:ln>
+            <a:solidFill>
+              <a:schemeClr val="tx1"/>
+            </a:solidFill>
+          </a:ln>
+        </p:spPr>
+        <p:style>
+          <a:lnRef idx="2">
+            <a:schemeClr val="accent6"/>
+          </a:lnRef>
+          <a:fillRef idx="1">
+            <a:schemeClr val="lt1"/>
+          </a:fillRef>
+          <a:effectRef idx="0">
+            <a:schemeClr val="accent6"/>
+          </a:effectRef>
+          <a:fontRef idx="minor">
+            <a:schemeClr val="dk1"/>
+          </a:fontRef>
+        </p:style>
+        <p:txBody>
+          <a:bodyPr rot="0" spcFirstLastPara="0" vert="horz" wrap="square" lIns="0" tIns="45720" rIns="0" bIns="45720" numCol="1" spcCol="0" rtlCol="0" fromWordArt="0" anchor="ctr" anchorCtr="0" forceAA="0" compatLnSpc="1">
+            <a:prstTxWarp prst="textNoShape">
+              <a:avLst/>
+            </a:prstTxWarp>
+            <a:noAutofit/>
+          </a:bodyPr>
+          <a:lstStyle/>
+          <a:p>
+            <a:pPr algn="ctr">
+              <a:lnSpc>
+                <a:spcPct val="115000"/>
+              </a:lnSpc>
+              <a:spcAft>
+                <a:spcPts val="1000"/>
+              </a:spcAft>
+            </a:pPr>
+            <a:r>
+              <a:rPr lang="en-US" sz="2000" b="1" dirty="0">
+                <a:ea typeface="Calibri"/>
+              </a:rPr>
+              <a:t>Pop 6</a:t>
+            </a:r>
+          </a:p>
+        </p:txBody>
+      </p:sp>
+      <p:sp>
+        <p:nvSpPr>
+          <p:cNvPr id="66" name="Oval 65"/>
+          <p:cNvSpPr/>
+          <p:nvPr/>
+        </p:nvSpPr>
+        <p:spPr>
+          <a:xfrm>
+            <a:off x="7293702" y="2403382"/>
+            <a:ext cx="1129926" cy="1065754"/>
+          </a:xfrm>
+          <a:prstGeom prst="ellipse">
+            <a:avLst/>
+          </a:prstGeom>
+          <a:solidFill>
+            <a:schemeClr val="accent5">
+              <a:lumMod val="60000"/>
+              <a:lumOff val="40000"/>
+            </a:schemeClr>
+          </a:solidFill>
+          <a:ln>
+            <a:solidFill>
+              <a:schemeClr val="tx1"/>
+            </a:solidFill>
+          </a:ln>
+        </p:spPr>
+        <p:style>
+          <a:lnRef idx="2">
+            <a:schemeClr val="accent6"/>
+          </a:lnRef>
+          <a:fillRef idx="1">
+            <a:schemeClr val="lt1"/>
+          </a:fillRef>
+          <a:effectRef idx="0">
+            <a:schemeClr val="accent6"/>
+          </a:effectRef>
+          <a:fontRef idx="minor">
+            <a:schemeClr val="dk1"/>
+          </a:fontRef>
+        </p:style>
+        <p:txBody>
+          <a:bodyPr rot="0" spcFirstLastPara="0" vert="horz" wrap="square" lIns="0" tIns="45720" rIns="0" bIns="45720" numCol="1" spcCol="0" rtlCol="0" fromWordArt="0" anchor="ctr" anchorCtr="0" forceAA="0" compatLnSpc="1">
+            <a:prstTxWarp prst="textNoShape">
+              <a:avLst/>
+            </a:prstTxWarp>
+            <a:noAutofit/>
+          </a:bodyPr>
+          <a:lstStyle/>
+          <a:p>
+            <a:pPr algn="ctr">
+              <a:lnSpc>
+                <a:spcPct val="115000"/>
+              </a:lnSpc>
+              <a:spcAft>
+                <a:spcPts val="1000"/>
+              </a:spcAft>
+            </a:pPr>
+            <a:r>
+              <a:rPr lang="en-US" sz="2000" b="1" dirty="0" smtClean="0">
+                <a:solidFill>
+                  <a:schemeClr val="dk1"/>
+                </a:solidFill>
+                <a:ea typeface="Calibri"/>
+              </a:rPr>
+              <a:t>Pop 7</a:t>
+            </a:r>
+            <a:endParaRPr lang="en-US" sz="2000" b="1" dirty="0">
+              <a:solidFill>
+                <a:schemeClr val="dk1"/>
+              </a:solidFill>
+              <a:ea typeface="Calibri"/>
+            </a:endParaRPr>
+          </a:p>
+        </p:txBody>
+      </p:sp>
+      <p:sp>
+        <p:nvSpPr>
+          <p:cNvPr id="67" name="Oval 66"/>
+          <p:cNvSpPr/>
+          <p:nvPr/>
+        </p:nvSpPr>
+        <p:spPr>
+          <a:xfrm>
+            <a:off x="7578583" y="3799569"/>
+            <a:ext cx="771755" cy="727924"/>
+          </a:xfrm>
+          <a:prstGeom prst="ellipse">
+            <a:avLst/>
+          </a:prstGeom>
+          <a:solidFill>
+            <a:schemeClr val="accent2">
+              <a:lumMod val="40000"/>
+              <a:lumOff val="60000"/>
+            </a:schemeClr>
+          </a:solidFill>
+          <a:ln>
+            <a:solidFill>
+              <a:schemeClr val="tx1"/>
+            </a:solidFill>
+          </a:ln>
+        </p:spPr>
+        <p:style>
+          <a:lnRef idx="2">
+            <a:schemeClr val="accent6"/>
+          </a:lnRef>
+          <a:fillRef idx="1">
+            <a:schemeClr val="lt1"/>
+          </a:fillRef>
+          <a:effectRef idx="0">
+            <a:schemeClr val="accent6"/>
+          </a:effectRef>
+          <a:fontRef idx="minor">
+            <a:schemeClr val="dk1"/>
+          </a:fontRef>
+        </p:style>
+        <p:txBody>
+          <a:bodyPr rot="0" spcFirstLastPara="0" vert="horz" wrap="square" lIns="0" tIns="45720" rIns="0" bIns="45720" numCol="1" spcCol="0" rtlCol="0" fromWordArt="0" anchor="ctr" anchorCtr="0" forceAA="0" compatLnSpc="1">
+            <a:prstTxWarp prst="textNoShape">
+              <a:avLst/>
+            </a:prstTxWarp>
+            <a:noAutofit/>
+          </a:bodyPr>
+          <a:lstStyle/>
+          <a:p>
+            <a:pPr algn="ctr">
+              <a:lnSpc>
+                <a:spcPct val="115000"/>
+              </a:lnSpc>
+              <a:spcAft>
+                <a:spcPts val="1000"/>
+              </a:spcAft>
+            </a:pPr>
+            <a:r>
+              <a:rPr lang="en-US" sz="2000" b="1" dirty="0">
+                <a:ea typeface="Calibri"/>
+              </a:rPr>
+              <a:t>Pop </a:t>
+            </a:r>
+            <a:r>
+              <a:rPr lang="en-US" sz="2000" b="1" dirty="0" smtClean="0">
+                <a:ea typeface="Calibri"/>
+              </a:rPr>
+              <a:t>8</a:t>
+            </a:r>
+            <a:endParaRPr lang="en-US" sz="2000" b="1" dirty="0">
+              <a:ea typeface="Calibri"/>
+            </a:endParaRPr>
+          </a:p>
+        </p:txBody>
+      </p:sp>
+      <p:sp>
+        <p:nvSpPr>
+          <p:cNvPr id="70" name="Oval 69"/>
+          <p:cNvSpPr/>
+          <p:nvPr/>
+        </p:nvSpPr>
+        <p:spPr>
+          <a:xfrm>
+            <a:off x="7263274" y="4727965"/>
+            <a:ext cx="1880726" cy="1788775"/>
+          </a:xfrm>
+          <a:prstGeom prst="ellipse">
+            <a:avLst/>
+          </a:prstGeom>
+          <a:solidFill>
+            <a:schemeClr val="accent3">
+              <a:lumMod val="60000"/>
+              <a:lumOff val="40000"/>
+            </a:schemeClr>
+          </a:solidFill>
+          <a:ln>
+            <a:solidFill>
+              <a:schemeClr val="tx1"/>
+            </a:solidFill>
+          </a:ln>
+        </p:spPr>
+        <p:style>
+          <a:lnRef idx="2">
+            <a:schemeClr val="accent6"/>
+          </a:lnRef>
+          <a:fillRef idx="1">
+            <a:schemeClr val="lt1"/>
+          </a:fillRef>
+          <a:effectRef idx="0">
+            <a:schemeClr val="accent6"/>
+          </a:effectRef>
+          <a:fontRef idx="minor">
+            <a:schemeClr val="dk1"/>
+          </a:fontRef>
+        </p:style>
+        <p:txBody>
+          <a:bodyPr rot="0" spcFirstLastPara="0" vert="horz" wrap="square" lIns="0" tIns="45720" rIns="0" bIns="45720" numCol="1" spcCol="0" rtlCol="0" fromWordArt="0" anchor="ctr" anchorCtr="0" forceAA="0" compatLnSpc="1">
+            <a:prstTxWarp prst="textNoShape">
+              <a:avLst/>
+            </a:prstTxWarp>
+            <a:noAutofit/>
+          </a:bodyPr>
+          <a:lstStyle/>
+          <a:p>
+            <a:pPr algn="ctr">
+              <a:lnSpc>
+                <a:spcPct val="115000"/>
+              </a:lnSpc>
+              <a:spcAft>
+                <a:spcPts val="1000"/>
+              </a:spcAft>
+            </a:pPr>
+            <a:r>
+              <a:rPr lang="en-US" sz="2000" b="1" dirty="0">
+                <a:ea typeface="Calibri"/>
+              </a:rPr>
+              <a:t>Pop 9</a:t>
+            </a:r>
+          </a:p>
+        </p:txBody>
+      </p:sp>
+      <p:sp>
+        <p:nvSpPr>
+          <p:cNvPr id="75" name="Isosceles Triangle 74"/>
+          <p:cNvSpPr/>
+          <p:nvPr/>
+        </p:nvSpPr>
+        <p:spPr>
+          <a:xfrm>
+            <a:off x="7193260" y="897029"/>
+            <a:ext cx="345194" cy="321589"/>
+          </a:xfrm>
+          <a:prstGeom prst="triangle">
+            <a:avLst/>
+          </a:prstGeom>
+          <a:solidFill>
+            <a:schemeClr val="bg1"/>
+          </a:solidFill>
+          <a:ln>
+            <a:solidFill>
+              <a:schemeClr val="tx1"/>
+            </a:solidFill>
+          </a:ln>
+        </p:spPr>
+        <p:style>
+          <a:lnRef idx="2">
+            <a:schemeClr val="accent6"/>
+          </a:lnRef>
+          <a:fillRef idx="1">
+            <a:schemeClr val="lt1"/>
+          </a:fillRef>
+          <a:effectRef idx="0">
+            <a:schemeClr val="accent6"/>
+          </a:effectRef>
+          <a:fontRef idx="minor">
+            <a:schemeClr val="dk1"/>
+          </a:fontRef>
+        </p:style>
+        <p:txBody>
+          <a:bodyPr rot="0" spcFirstLastPara="0" vert="horz" wrap="square" lIns="0" tIns="45720" rIns="0" bIns="45720" numCol="1" spcCol="0" rtlCol="0" fromWordArt="0" anchor="ctr" anchorCtr="0" forceAA="0" compatLnSpc="1">
+            <a:prstTxWarp prst="textNoShape">
+              <a:avLst/>
+            </a:prstTxWarp>
+            <a:noAutofit/>
+          </a:bodyPr>
+          <a:lstStyle/>
+          <a:p>
+            <a:pPr algn="ctr">
+              <a:lnSpc>
+                <a:spcPct val="115000"/>
+              </a:lnSpc>
+              <a:spcAft>
+                <a:spcPts val="1000"/>
+              </a:spcAft>
+            </a:pPr>
+            <a:endParaRPr lang="en-US" sz="2000" b="1" dirty="0">
+              <a:solidFill>
+                <a:schemeClr val="dk1"/>
+              </a:solidFill>
+              <a:ea typeface="Calibri"/>
+            </a:endParaRPr>
+          </a:p>
+        </p:txBody>
+      </p:sp>
+      <p:sp>
+        <p:nvSpPr>
+          <p:cNvPr id="76" name="TextBox 75"/>
+          <p:cNvSpPr txBox="1"/>
+          <p:nvPr/>
+        </p:nvSpPr>
+        <p:spPr>
+          <a:xfrm>
+            <a:off x="6617514" y="58723"/>
+            <a:ext cx="2734955" cy="439541"/>
+          </a:xfrm>
+          <a:prstGeom prst="rect">
+            <a:avLst/>
+          </a:prstGeom>
+          <a:noFill/>
+        </p:spPr>
+        <p:txBody>
+          <a:bodyPr wrap="square" rtlCol="0">
+            <a:spAutoFit/>
+          </a:bodyPr>
+          <a:lstStyle/>
+          <a:p>
+            <a:r>
+              <a:rPr lang="en-US" sz="2000" b="1" u="sng" dirty="0" smtClean="0"/>
+              <a:t>Detection Probabilities</a:t>
+            </a:r>
+            <a:endParaRPr lang="en-US" sz="2000" b="1" u="sng" dirty="0"/>
+          </a:p>
+        </p:txBody>
+      </p:sp>
+      <p:sp>
+        <p:nvSpPr>
+          <p:cNvPr id="77" name="TextBox 76"/>
+          <p:cNvSpPr txBox="1"/>
+          <p:nvPr/>
+        </p:nvSpPr>
+        <p:spPr>
+          <a:xfrm>
+            <a:off x="7714425" y="475224"/>
+            <a:ext cx="1176121" cy="369332"/>
+          </a:xfrm>
+          <a:prstGeom prst="rect">
+            <a:avLst/>
+          </a:prstGeom>
+          <a:noFill/>
+        </p:spPr>
+        <p:txBody>
+          <a:bodyPr wrap="square" rtlCol="0">
+            <a:spAutoFit/>
+          </a:bodyPr>
+          <a:lstStyle/>
+          <a:p>
+            <a:r>
+              <a:rPr lang="en-US" dirty="0" smtClean="0"/>
+              <a:t>Low / Low</a:t>
+            </a:r>
+            <a:endParaRPr lang="en-US" dirty="0"/>
+          </a:p>
+        </p:txBody>
+      </p:sp>
+      <p:sp>
+        <p:nvSpPr>
+          <p:cNvPr id="78" name="TextBox 77"/>
+          <p:cNvSpPr txBox="1"/>
+          <p:nvPr/>
+        </p:nvSpPr>
+        <p:spPr>
+          <a:xfrm>
+            <a:off x="7714425" y="891381"/>
+            <a:ext cx="1293733" cy="369332"/>
+          </a:xfrm>
+          <a:prstGeom prst="rect">
+            <a:avLst/>
+          </a:prstGeom>
+          <a:noFill/>
+        </p:spPr>
+        <p:txBody>
+          <a:bodyPr wrap="square" rtlCol="0">
+            <a:spAutoFit/>
+          </a:bodyPr>
+          <a:lstStyle/>
+          <a:p>
+            <a:r>
+              <a:rPr lang="en-US" dirty="0" smtClean="0"/>
+              <a:t>High / High</a:t>
+            </a:r>
+            <a:endParaRPr lang="en-US" dirty="0"/>
+          </a:p>
+        </p:txBody>
+      </p:sp>
+      <p:sp>
+        <p:nvSpPr>
+          <p:cNvPr id="79" name="TextBox 78"/>
+          <p:cNvSpPr txBox="1"/>
+          <p:nvPr/>
+        </p:nvSpPr>
+        <p:spPr>
+          <a:xfrm>
+            <a:off x="7714425" y="1323493"/>
+            <a:ext cx="1293733" cy="369332"/>
+          </a:xfrm>
+          <a:prstGeom prst="rect">
+            <a:avLst/>
+          </a:prstGeom>
+          <a:noFill/>
+        </p:spPr>
+        <p:txBody>
+          <a:bodyPr wrap="square" rtlCol="0">
+            <a:spAutoFit/>
+          </a:bodyPr>
+          <a:lstStyle/>
+          <a:p>
+            <a:r>
+              <a:rPr lang="en-US" dirty="0" smtClean="0"/>
+              <a:t>Low / High</a:t>
+            </a:r>
+            <a:endParaRPr lang="en-US" dirty="0"/>
+          </a:p>
+        </p:txBody>
+      </p:sp>
+      <p:sp>
+        <p:nvSpPr>
+          <p:cNvPr id="80" name="Rectangle 79"/>
+          <p:cNvSpPr/>
+          <p:nvPr/>
+        </p:nvSpPr>
+        <p:spPr>
+          <a:xfrm>
+            <a:off x="7199543" y="521148"/>
+            <a:ext cx="307650" cy="277485"/>
+          </a:xfrm>
+          <a:prstGeom prst="rect">
+            <a:avLst/>
+          </a:prstGeom>
+          <a:solidFill>
+            <a:schemeClr val="bg1"/>
+          </a:solidFill>
+          <a:ln>
+            <a:solidFill>
+              <a:schemeClr val="tx1"/>
+            </a:solidFill>
+          </a:ln>
+        </p:spPr>
+        <p:style>
+          <a:lnRef idx="2">
+            <a:schemeClr val="accent6"/>
+          </a:lnRef>
+          <a:fillRef idx="1">
+            <a:schemeClr val="lt1"/>
+          </a:fillRef>
+          <a:effectRef idx="0">
+            <a:schemeClr val="accent6"/>
+          </a:effectRef>
+          <a:fontRef idx="minor">
+            <a:schemeClr val="dk1"/>
+          </a:fontRef>
+        </p:style>
+        <p:txBody>
+          <a:bodyPr rot="0" spcFirstLastPara="0" vert="horz" wrap="square" lIns="0" tIns="45720" rIns="0" bIns="45720" numCol="1" spcCol="0" rtlCol="0" fromWordArt="0" anchor="ctr" anchorCtr="0" forceAA="0" compatLnSpc="1">
+            <a:prstTxWarp prst="textNoShape">
+              <a:avLst/>
+            </a:prstTxWarp>
+            <a:noAutofit/>
+          </a:bodyPr>
+          <a:lstStyle/>
+          <a:p>
+            <a:pPr algn="ctr">
+              <a:lnSpc>
+                <a:spcPct val="115000"/>
+              </a:lnSpc>
+              <a:spcAft>
+                <a:spcPts val="1000"/>
+              </a:spcAft>
+            </a:pPr>
+            <a:endParaRPr lang="en-US" sz="2000" b="1">
+              <a:solidFill>
+                <a:schemeClr val="dk1"/>
+              </a:solidFill>
+              <a:ea typeface="Calibri"/>
+            </a:endParaRPr>
+          </a:p>
+        </p:txBody>
+      </p:sp>
+      <p:sp>
+        <p:nvSpPr>
+          <p:cNvPr id="81" name="Oval 80"/>
+          <p:cNvSpPr/>
+          <p:nvPr/>
+        </p:nvSpPr>
+        <p:spPr>
+          <a:xfrm>
+            <a:off x="7207691" y="1354366"/>
+            <a:ext cx="313933" cy="289596"/>
+          </a:xfrm>
+          <a:prstGeom prst="ellipse">
+            <a:avLst/>
+          </a:prstGeom>
+          <a:solidFill>
+            <a:schemeClr val="bg1"/>
+          </a:solidFill>
+          <a:ln>
+            <a:solidFill>
+              <a:schemeClr val="tx1"/>
+            </a:solidFill>
+          </a:ln>
+        </p:spPr>
+        <p:style>
+          <a:lnRef idx="2">
+            <a:schemeClr val="accent6"/>
+          </a:lnRef>
+          <a:fillRef idx="1">
+            <a:schemeClr val="lt1"/>
+          </a:fillRef>
+          <a:effectRef idx="0">
+            <a:schemeClr val="accent6"/>
+          </a:effectRef>
+          <a:fontRef idx="minor">
+            <a:schemeClr val="dk1"/>
+          </a:fontRef>
+        </p:style>
+        <p:txBody>
+          <a:bodyPr rot="0" spcFirstLastPara="0" vert="horz" wrap="square" lIns="0" tIns="45720" rIns="0" bIns="45720" numCol="1" spcCol="0" rtlCol="0" fromWordArt="0" anchor="ctr" anchorCtr="0" forceAA="0" compatLnSpc="1">
+            <a:prstTxWarp prst="textNoShape">
+              <a:avLst/>
+            </a:prstTxWarp>
+            <a:noAutofit/>
+          </a:bodyPr>
+          <a:lstStyle/>
+          <a:p>
+            <a:pPr algn="ctr">
+              <a:lnSpc>
+                <a:spcPct val="115000"/>
+              </a:lnSpc>
+              <a:spcAft>
+                <a:spcPts val="1000"/>
+              </a:spcAft>
+            </a:pPr>
+            <a:endParaRPr lang="en-US" sz="2000" b="1">
+              <a:solidFill>
+                <a:schemeClr val="dk1"/>
+              </a:solidFill>
+              <a:ea typeface="Calibri"/>
+            </a:endParaRPr>
+          </a:p>
+        </p:txBody>
+      </p:sp>
       <p:grpSp>
         <p:nvGrpSpPr>
           <p:cNvPr id="4" name="Group 3"/>
@@ -3103,8 +4553,8 @@
         </p:nvGrpSpPr>
         <p:grpSpPr>
           <a:xfrm>
-            <a:off x="3952304" y="5811421"/>
-            <a:ext cx="1239392" cy="841271"/>
+            <a:off x="3732754" y="5381458"/>
+            <a:ext cx="1649630" cy="1354876"/>
             <a:chOff x="3657600" y="5943600"/>
             <a:chExt cx="1463777" cy="849197"/>
           </a:xfrm>
@@ -3210,7 +4660,7 @@
                 </a:spcAft>
               </a:pPr>
               <a:r>
-                <a:rPr lang="en-US" sz="2400" b="1" dirty="0" smtClean="0">
+                <a:rPr lang="en-US" sz="3200" b="1" dirty="0" smtClean="0">
                   <a:ea typeface="Calibri"/>
                   <a:cs typeface="Times New Roman"/>
                 </a:rPr>
@@ -3225,1072 +4675,6 @@
           </p:txBody>
         </p:sp>
       </p:grpSp>
-      <p:sp>
-        <p:nvSpPr>
-          <p:cNvPr id="7" name="Rectangle 6"/>
-          <p:cNvSpPr/>
-          <p:nvPr/>
-        </p:nvSpPr>
-        <p:spPr>
-          <a:xfrm>
-            <a:off x="272178" y="4131588"/>
-            <a:ext cx="793497" cy="730449"/>
-          </a:xfrm>
-          <a:prstGeom prst="rect">
-            <a:avLst/>
-          </a:prstGeom>
-          <a:ln>
-            <a:solidFill>
-              <a:schemeClr val="tx1"/>
-            </a:solidFill>
-          </a:ln>
-        </p:spPr>
-        <p:style>
-          <a:lnRef idx="2">
-            <a:schemeClr val="accent6"/>
-          </a:lnRef>
-          <a:fillRef idx="1">
-            <a:schemeClr val="lt1"/>
-          </a:fillRef>
-          <a:effectRef idx="0">
-            <a:schemeClr val="accent6"/>
-          </a:effectRef>
-          <a:fontRef idx="minor">
-            <a:schemeClr val="dk1"/>
-          </a:fontRef>
-        </p:style>
-        <p:txBody>
-          <a:bodyPr rot="0" spcFirstLastPara="0" vert="horz" wrap="square" lIns="0" tIns="45720" rIns="0" bIns="45720" numCol="1" spcCol="0" rtlCol="0" fromWordArt="0" anchor="ctr" anchorCtr="0" forceAA="0" compatLnSpc="1">
-            <a:prstTxWarp prst="textNoShape">
-              <a:avLst/>
-            </a:prstTxWarp>
-            <a:noAutofit/>
-          </a:bodyPr>
-          <a:lstStyle/>
-          <a:p>
-            <a:pPr marL="0" marR="0" algn="ctr">
-              <a:lnSpc>
-                <a:spcPct val="115000"/>
-              </a:lnSpc>
-              <a:spcBef>
-                <a:spcPts val="0"/>
-              </a:spcBef>
-              <a:spcAft>
-                <a:spcPts val="1000"/>
-              </a:spcAft>
-            </a:pPr>
-            <a:r>
-              <a:rPr lang="en-US" sz="2000" b="1" dirty="0" smtClean="0">
-                <a:effectLst/>
-                <a:ea typeface="Calibri"/>
-              </a:rPr>
-              <a:t>Pop 1</a:t>
-            </a:r>
-            <a:endParaRPr lang="en-US" sz="1200" dirty="0">
-              <a:effectLst/>
-              <a:latin typeface="Times New Roman"/>
-              <a:ea typeface="ＭＳ 明朝"/>
-            </a:endParaRPr>
-          </a:p>
-        </p:txBody>
-      </p:sp>
-      <p:sp>
-        <p:nvSpPr>
-          <p:cNvPr id="8" name="Rectangle 7"/>
-          <p:cNvSpPr/>
-          <p:nvPr/>
-        </p:nvSpPr>
-        <p:spPr>
-          <a:xfrm>
-            <a:off x="821326" y="5811421"/>
-            <a:ext cx="793497" cy="730449"/>
-          </a:xfrm>
-          <a:prstGeom prst="rect">
-            <a:avLst/>
-          </a:prstGeom>
-          <a:solidFill>
-            <a:schemeClr val="tx1"/>
-          </a:solidFill>
-          <a:ln>
-            <a:solidFill>
-              <a:schemeClr val="tx1"/>
-            </a:solidFill>
-          </a:ln>
-        </p:spPr>
-        <p:style>
-          <a:lnRef idx="2">
-            <a:schemeClr val="accent6"/>
-          </a:lnRef>
-          <a:fillRef idx="1">
-            <a:schemeClr val="lt1"/>
-          </a:fillRef>
-          <a:effectRef idx="0">
-            <a:schemeClr val="accent6"/>
-          </a:effectRef>
-          <a:fontRef idx="minor">
-            <a:schemeClr val="dk1"/>
-          </a:fontRef>
-        </p:style>
-        <p:txBody>
-          <a:bodyPr rot="0" spcFirstLastPara="0" vert="horz" wrap="square" lIns="0" tIns="45720" rIns="0" bIns="45720" numCol="1" spcCol="0" rtlCol="0" fromWordArt="0" anchor="ctr" anchorCtr="0" forceAA="0" compatLnSpc="1">
-            <a:prstTxWarp prst="textNoShape">
-              <a:avLst/>
-            </a:prstTxWarp>
-            <a:noAutofit/>
-          </a:bodyPr>
-          <a:lstStyle/>
-          <a:p>
-            <a:pPr marL="0" marR="0" algn="ctr">
-              <a:lnSpc>
-                <a:spcPct val="115000"/>
-              </a:lnSpc>
-              <a:spcBef>
-                <a:spcPts val="0"/>
-              </a:spcBef>
-              <a:spcAft>
-                <a:spcPts val="1000"/>
-              </a:spcAft>
-            </a:pPr>
-            <a:endParaRPr lang="en-US" sz="1200" dirty="0">
-              <a:effectLst/>
-              <a:latin typeface="Times New Roman"/>
-              <a:ea typeface="ＭＳ 明朝"/>
-            </a:endParaRPr>
-          </a:p>
-        </p:txBody>
-      </p:sp>
-      <p:sp>
-        <p:nvSpPr>
-          <p:cNvPr id="9" name="Rectangle 8"/>
-          <p:cNvSpPr/>
-          <p:nvPr/>
-        </p:nvSpPr>
-        <p:spPr>
-          <a:xfrm>
-            <a:off x="668926" y="2896572"/>
-            <a:ext cx="793497" cy="730449"/>
-          </a:xfrm>
-          <a:prstGeom prst="rect">
-            <a:avLst/>
-          </a:prstGeom>
-          <a:ln>
-            <a:solidFill>
-              <a:schemeClr val="tx1"/>
-            </a:solidFill>
-          </a:ln>
-        </p:spPr>
-        <p:style>
-          <a:lnRef idx="2">
-            <a:schemeClr val="accent6"/>
-          </a:lnRef>
-          <a:fillRef idx="1">
-            <a:schemeClr val="lt1"/>
-          </a:fillRef>
-          <a:effectRef idx="0">
-            <a:schemeClr val="accent6"/>
-          </a:effectRef>
-          <a:fontRef idx="minor">
-            <a:schemeClr val="dk1"/>
-          </a:fontRef>
-        </p:style>
-        <p:txBody>
-          <a:bodyPr rot="0" spcFirstLastPara="0" vert="horz" wrap="square" lIns="0" tIns="45720" rIns="0" bIns="45720" numCol="1" spcCol="0" rtlCol="0" fromWordArt="0" anchor="ctr" anchorCtr="0" forceAA="0" compatLnSpc="1">
-            <a:prstTxWarp prst="textNoShape">
-              <a:avLst/>
-            </a:prstTxWarp>
-            <a:noAutofit/>
-          </a:bodyPr>
-          <a:lstStyle/>
-          <a:p>
-            <a:pPr marL="0" marR="0" algn="ctr">
-              <a:lnSpc>
-                <a:spcPct val="115000"/>
-              </a:lnSpc>
-              <a:spcBef>
-                <a:spcPts val="0"/>
-              </a:spcBef>
-              <a:spcAft>
-                <a:spcPts val="1000"/>
-              </a:spcAft>
-            </a:pPr>
-            <a:r>
-              <a:rPr lang="en-US" sz="2000" b="1" dirty="0" smtClean="0">
-                <a:effectLst/>
-                <a:ea typeface="Calibri"/>
-              </a:rPr>
-              <a:t>Pop 2</a:t>
-            </a:r>
-            <a:endParaRPr lang="en-US" sz="1200" dirty="0">
-              <a:effectLst/>
-              <a:latin typeface="Times New Roman"/>
-              <a:ea typeface="ＭＳ 明朝"/>
-            </a:endParaRPr>
-          </a:p>
-        </p:txBody>
-      </p:sp>
-      <p:sp>
-        <p:nvSpPr>
-          <p:cNvPr id="10" name="Rectangle 9"/>
-          <p:cNvSpPr/>
-          <p:nvPr/>
-        </p:nvSpPr>
-        <p:spPr>
-          <a:xfrm>
-            <a:off x="1065675" y="1801871"/>
-            <a:ext cx="793497" cy="730449"/>
-          </a:xfrm>
-          <a:prstGeom prst="rect">
-            <a:avLst/>
-          </a:prstGeom>
-          <a:ln>
-            <a:solidFill>
-              <a:schemeClr val="tx1"/>
-            </a:solidFill>
-          </a:ln>
-        </p:spPr>
-        <p:style>
-          <a:lnRef idx="2">
-            <a:schemeClr val="accent6"/>
-          </a:lnRef>
-          <a:fillRef idx="1">
-            <a:schemeClr val="lt1"/>
-          </a:fillRef>
-          <a:effectRef idx="0">
-            <a:schemeClr val="accent6"/>
-          </a:effectRef>
-          <a:fontRef idx="minor">
-            <a:schemeClr val="dk1"/>
-          </a:fontRef>
-        </p:style>
-        <p:txBody>
-          <a:bodyPr rot="0" spcFirstLastPara="0" vert="horz" wrap="square" lIns="0" tIns="45720" rIns="0" bIns="45720" numCol="1" spcCol="0" rtlCol="0" fromWordArt="0" anchor="ctr" anchorCtr="0" forceAA="0" compatLnSpc="1">
-            <a:prstTxWarp prst="textNoShape">
-              <a:avLst/>
-            </a:prstTxWarp>
-            <a:noAutofit/>
-          </a:bodyPr>
-          <a:lstStyle/>
-          <a:p>
-            <a:pPr marL="0" marR="0" algn="ctr">
-              <a:lnSpc>
-                <a:spcPct val="115000"/>
-              </a:lnSpc>
-              <a:spcBef>
-                <a:spcPts val="0"/>
-              </a:spcBef>
-              <a:spcAft>
-                <a:spcPts val="1000"/>
-              </a:spcAft>
-            </a:pPr>
-            <a:r>
-              <a:rPr lang="en-US" sz="2000" b="1" dirty="0" smtClean="0">
-                <a:effectLst/>
-                <a:ea typeface="Calibri"/>
-              </a:rPr>
-              <a:t>Pop 3</a:t>
-            </a:r>
-            <a:endParaRPr lang="en-US" sz="1200" dirty="0">
-              <a:effectLst/>
-              <a:latin typeface="Times New Roman"/>
-              <a:ea typeface="ＭＳ 明朝"/>
-            </a:endParaRPr>
-          </a:p>
-        </p:txBody>
-      </p:sp>
-      <p:sp>
-        <p:nvSpPr>
-          <p:cNvPr id="11" name="Rectangle 10"/>
-          <p:cNvSpPr/>
-          <p:nvPr/>
-        </p:nvSpPr>
-        <p:spPr>
-          <a:xfrm>
-            <a:off x="2488120" y="669536"/>
-            <a:ext cx="793497" cy="730449"/>
-          </a:xfrm>
-          <a:prstGeom prst="rect">
-            <a:avLst/>
-          </a:prstGeom>
-          <a:ln>
-            <a:solidFill>
-              <a:schemeClr val="tx1"/>
-            </a:solidFill>
-          </a:ln>
-        </p:spPr>
-        <p:style>
-          <a:lnRef idx="2">
-            <a:schemeClr val="accent6"/>
-          </a:lnRef>
-          <a:fillRef idx="1">
-            <a:schemeClr val="lt1"/>
-          </a:fillRef>
-          <a:effectRef idx="0">
-            <a:schemeClr val="accent6"/>
-          </a:effectRef>
-          <a:fontRef idx="minor">
-            <a:schemeClr val="dk1"/>
-          </a:fontRef>
-        </p:style>
-        <p:txBody>
-          <a:bodyPr rot="0" spcFirstLastPara="0" vert="horz" wrap="square" lIns="0" tIns="45720" rIns="0" bIns="45720" numCol="1" spcCol="0" rtlCol="0" fromWordArt="0" anchor="ctr" anchorCtr="0" forceAA="0" compatLnSpc="1">
-            <a:prstTxWarp prst="textNoShape">
-              <a:avLst/>
-            </a:prstTxWarp>
-            <a:noAutofit/>
-          </a:bodyPr>
-          <a:lstStyle/>
-          <a:p>
-            <a:pPr marL="0" marR="0" algn="ctr">
-              <a:lnSpc>
-                <a:spcPct val="115000"/>
-              </a:lnSpc>
-              <a:spcBef>
-                <a:spcPts val="0"/>
-              </a:spcBef>
-              <a:spcAft>
-                <a:spcPts val="1000"/>
-              </a:spcAft>
-            </a:pPr>
-            <a:r>
-              <a:rPr lang="en-US" sz="2000" b="1" dirty="0" smtClean="0">
-                <a:effectLst/>
-                <a:ea typeface="Calibri"/>
-              </a:rPr>
-              <a:t>Pop 4</a:t>
-            </a:r>
-            <a:endParaRPr lang="en-US" sz="1200" dirty="0">
-              <a:effectLst/>
-              <a:latin typeface="Times New Roman"/>
-              <a:ea typeface="ＭＳ 明朝"/>
-            </a:endParaRPr>
-          </a:p>
-        </p:txBody>
-      </p:sp>
-      <p:sp>
-        <p:nvSpPr>
-          <p:cNvPr id="12" name="Rectangle 11"/>
-          <p:cNvSpPr/>
-          <p:nvPr/>
-        </p:nvSpPr>
-        <p:spPr>
-          <a:xfrm>
-            <a:off x="4137254" y="669536"/>
-            <a:ext cx="793497" cy="730449"/>
-          </a:xfrm>
-          <a:prstGeom prst="rect">
-            <a:avLst/>
-          </a:prstGeom>
-          <a:ln>
-            <a:solidFill>
-              <a:schemeClr val="tx1"/>
-            </a:solidFill>
-          </a:ln>
-        </p:spPr>
-        <p:style>
-          <a:lnRef idx="2">
-            <a:schemeClr val="accent6"/>
-          </a:lnRef>
-          <a:fillRef idx="1">
-            <a:schemeClr val="lt1"/>
-          </a:fillRef>
-          <a:effectRef idx="0">
-            <a:schemeClr val="accent6"/>
-          </a:effectRef>
-          <a:fontRef idx="minor">
-            <a:schemeClr val="dk1"/>
-          </a:fontRef>
-        </p:style>
-        <p:txBody>
-          <a:bodyPr rot="0" spcFirstLastPara="0" vert="horz" wrap="square" lIns="0" tIns="45720" rIns="0" bIns="45720" numCol="1" spcCol="0" rtlCol="0" fromWordArt="0" anchor="ctr" anchorCtr="0" forceAA="0" compatLnSpc="1">
-            <a:prstTxWarp prst="textNoShape">
-              <a:avLst/>
-            </a:prstTxWarp>
-            <a:noAutofit/>
-          </a:bodyPr>
-          <a:lstStyle/>
-          <a:p>
-            <a:pPr marL="0" marR="0" algn="ctr">
-              <a:lnSpc>
-                <a:spcPct val="115000"/>
-              </a:lnSpc>
-              <a:spcBef>
-                <a:spcPts val="0"/>
-              </a:spcBef>
-              <a:spcAft>
-                <a:spcPts val="1000"/>
-              </a:spcAft>
-            </a:pPr>
-            <a:r>
-              <a:rPr lang="en-US" sz="2000" b="1" dirty="0" smtClean="0">
-                <a:effectLst/>
-                <a:ea typeface="Calibri"/>
-              </a:rPr>
-              <a:t>Pop 5</a:t>
-            </a:r>
-            <a:endParaRPr lang="en-US" sz="1200" dirty="0">
-              <a:effectLst/>
-              <a:latin typeface="Times New Roman"/>
-              <a:ea typeface="ＭＳ 明朝"/>
-            </a:endParaRPr>
-          </a:p>
-        </p:txBody>
-      </p:sp>
-      <p:sp>
-        <p:nvSpPr>
-          <p:cNvPr id="13" name="Rectangle 12"/>
-          <p:cNvSpPr/>
-          <p:nvPr/>
-        </p:nvSpPr>
-        <p:spPr>
-          <a:xfrm>
-            <a:off x="5851679" y="669536"/>
-            <a:ext cx="793497" cy="730449"/>
-          </a:xfrm>
-          <a:prstGeom prst="rect">
-            <a:avLst/>
-          </a:prstGeom>
-          <a:ln>
-            <a:solidFill>
-              <a:schemeClr val="tx1"/>
-            </a:solidFill>
-          </a:ln>
-        </p:spPr>
-        <p:style>
-          <a:lnRef idx="2">
-            <a:schemeClr val="accent6"/>
-          </a:lnRef>
-          <a:fillRef idx="1">
-            <a:schemeClr val="lt1"/>
-          </a:fillRef>
-          <a:effectRef idx="0">
-            <a:schemeClr val="accent6"/>
-          </a:effectRef>
-          <a:fontRef idx="minor">
-            <a:schemeClr val="dk1"/>
-          </a:fontRef>
-        </p:style>
-        <p:txBody>
-          <a:bodyPr rot="0" spcFirstLastPara="0" vert="horz" wrap="square" lIns="0" tIns="45720" rIns="0" bIns="45720" numCol="1" spcCol="0" rtlCol="0" fromWordArt="0" anchor="ctr" anchorCtr="0" forceAA="0" compatLnSpc="1">
-            <a:prstTxWarp prst="textNoShape">
-              <a:avLst/>
-            </a:prstTxWarp>
-            <a:noAutofit/>
-          </a:bodyPr>
-          <a:lstStyle/>
-          <a:p>
-            <a:pPr marL="0" marR="0" algn="ctr">
-              <a:lnSpc>
-                <a:spcPct val="115000"/>
-              </a:lnSpc>
-              <a:spcBef>
-                <a:spcPts val="0"/>
-              </a:spcBef>
-              <a:spcAft>
-                <a:spcPts val="1000"/>
-              </a:spcAft>
-            </a:pPr>
-            <a:r>
-              <a:rPr lang="en-US" sz="2000" b="1" dirty="0" smtClean="0">
-                <a:effectLst/>
-                <a:ea typeface="Calibri"/>
-              </a:rPr>
-              <a:t>Pop 6</a:t>
-            </a:r>
-            <a:endParaRPr lang="en-US" sz="1200" dirty="0">
-              <a:effectLst/>
-              <a:latin typeface="Times New Roman"/>
-              <a:ea typeface="ＭＳ 明朝"/>
-            </a:endParaRPr>
-          </a:p>
-        </p:txBody>
-      </p:sp>
-      <p:sp>
-        <p:nvSpPr>
-          <p:cNvPr id="14" name="Rectangle 13"/>
-          <p:cNvSpPr/>
-          <p:nvPr/>
-        </p:nvSpPr>
-        <p:spPr>
-          <a:xfrm>
-            <a:off x="7181835" y="1801871"/>
-            <a:ext cx="793497" cy="730449"/>
-          </a:xfrm>
-          <a:prstGeom prst="rect">
-            <a:avLst/>
-          </a:prstGeom>
-          <a:ln>
-            <a:solidFill>
-              <a:schemeClr val="tx1"/>
-            </a:solidFill>
-          </a:ln>
-        </p:spPr>
-        <p:style>
-          <a:lnRef idx="2">
-            <a:schemeClr val="accent6"/>
-          </a:lnRef>
-          <a:fillRef idx="1">
-            <a:schemeClr val="lt1"/>
-          </a:fillRef>
-          <a:effectRef idx="0">
-            <a:schemeClr val="accent6"/>
-          </a:effectRef>
-          <a:fontRef idx="minor">
-            <a:schemeClr val="dk1"/>
-          </a:fontRef>
-        </p:style>
-        <p:txBody>
-          <a:bodyPr rot="0" spcFirstLastPara="0" vert="horz" wrap="square" lIns="0" tIns="45720" rIns="0" bIns="45720" numCol="1" spcCol="0" rtlCol="0" fromWordArt="0" anchor="ctr" anchorCtr="0" forceAA="0" compatLnSpc="1">
-            <a:prstTxWarp prst="textNoShape">
-              <a:avLst/>
-            </a:prstTxWarp>
-            <a:noAutofit/>
-          </a:bodyPr>
-          <a:lstStyle/>
-          <a:p>
-            <a:pPr marL="0" marR="0" algn="ctr">
-              <a:lnSpc>
-                <a:spcPct val="115000"/>
-              </a:lnSpc>
-              <a:spcBef>
-                <a:spcPts val="0"/>
-              </a:spcBef>
-              <a:spcAft>
-                <a:spcPts val="1000"/>
-              </a:spcAft>
-            </a:pPr>
-            <a:r>
-              <a:rPr lang="en-US" sz="2000" b="1" dirty="0" smtClean="0">
-                <a:effectLst/>
-                <a:ea typeface="Calibri"/>
-              </a:rPr>
-              <a:t>Pop 7</a:t>
-            </a:r>
-            <a:endParaRPr lang="en-US" sz="1200" dirty="0">
-              <a:effectLst/>
-              <a:latin typeface="Times New Roman"/>
-              <a:ea typeface="ＭＳ 明朝"/>
-            </a:endParaRPr>
-          </a:p>
-        </p:txBody>
-      </p:sp>
-      <p:sp>
-        <p:nvSpPr>
-          <p:cNvPr id="15" name="Rectangle 14"/>
-          <p:cNvSpPr/>
-          <p:nvPr/>
-        </p:nvSpPr>
-        <p:spPr>
-          <a:xfrm>
-            <a:off x="7578583" y="2896572"/>
-            <a:ext cx="793497" cy="730449"/>
-          </a:xfrm>
-          <a:prstGeom prst="rect">
-            <a:avLst/>
-          </a:prstGeom>
-          <a:ln>
-            <a:solidFill>
-              <a:schemeClr val="tx1"/>
-            </a:solidFill>
-          </a:ln>
-        </p:spPr>
-        <p:style>
-          <a:lnRef idx="2">
-            <a:schemeClr val="accent6"/>
-          </a:lnRef>
-          <a:fillRef idx="1">
-            <a:schemeClr val="lt1"/>
-          </a:fillRef>
-          <a:effectRef idx="0">
-            <a:schemeClr val="accent6"/>
-          </a:effectRef>
-          <a:fontRef idx="minor">
-            <a:schemeClr val="dk1"/>
-          </a:fontRef>
-        </p:style>
-        <p:txBody>
-          <a:bodyPr rot="0" spcFirstLastPara="0" vert="horz" wrap="square" lIns="0" tIns="45720" rIns="0" bIns="45720" numCol="1" spcCol="0" rtlCol="0" fromWordArt="0" anchor="ctr" anchorCtr="0" forceAA="0" compatLnSpc="1">
-            <a:prstTxWarp prst="textNoShape">
-              <a:avLst/>
-            </a:prstTxWarp>
-            <a:noAutofit/>
-          </a:bodyPr>
-          <a:lstStyle/>
-          <a:p>
-            <a:pPr marL="0" marR="0" algn="ctr">
-              <a:lnSpc>
-                <a:spcPct val="115000"/>
-              </a:lnSpc>
-              <a:spcBef>
-                <a:spcPts val="0"/>
-              </a:spcBef>
-              <a:spcAft>
-                <a:spcPts val="1000"/>
-              </a:spcAft>
-            </a:pPr>
-            <a:r>
-              <a:rPr lang="en-US" sz="2000" b="1" dirty="0" smtClean="0">
-                <a:effectLst/>
-                <a:ea typeface="Calibri"/>
-              </a:rPr>
-              <a:t>Pop 8</a:t>
-            </a:r>
-            <a:endParaRPr lang="en-US" sz="1200" dirty="0">
-              <a:effectLst/>
-              <a:latin typeface="Times New Roman"/>
-              <a:ea typeface="ＭＳ 明朝"/>
-            </a:endParaRPr>
-          </a:p>
-        </p:txBody>
-      </p:sp>
-      <p:sp>
-        <p:nvSpPr>
-          <p:cNvPr id="16" name="Rectangle 15"/>
-          <p:cNvSpPr/>
-          <p:nvPr/>
-        </p:nvSpPr>
-        <p:spPr>
-          <a:xfrm>
-            <a:off x="7975331" y="4131588"/>
-            <a:ext cx="793497" cy="730449"/>
-          </a:xfrm>
-          <a:prstGeom prst="rect">
-            <a:avLst/>
-          </a:prstGeom>
-          <a:ln>
-            <a:solidFill>
-              <a:schemeClr val="tx1"/>
-            </a:solidFill>
-          </a:ln>
-        </p:spPr>
-        <p:style>
-          <a:lnRef idx="2">
-            <a:schemeClr val="accent6"/>
-          </a:lnRef>
-          <a:fillRef idx="1">
-            <a:schemeClr val="lt1"/>
-          </a:fillRef>
-          <a:effectRef idx="0">
-            <a:schemeClr val="accent6"/>
-          </a:effectRef>
-          <a:fontRef idx="minor">
-            <a:schemeClr val="dk1"/>
-          </a:fontRef>
-        </p:style>
-        <p:txBody>
-          <a:bodyPr rot="0" spcFirstLastPara="0" vert="horz" wrap="square" lIns="0" tIns="45720" rIns="0" bIns="45720" numCol="1" spcCol="0" rtlCol="0" fromWordArt="0" anchor="ctr" anchorCtr="0" forceAA="0" compatLnSpc="1">
-            <a:prstTxWarp prst="textNoShape">
-              <a:avLst/>
-            </a:prstTxWarp>
-            <a:noAutofit/>
-          </a:bodyPr>
-          <a:lstStyle/>
-          <a:p>
-            <a:pPr marL="0" marR="0" algn="ctr">
-              <a:lnSpc>
-                <a:spcPct val="115000"/>
-              </a:lnSpc>
-              <a:spcBef>
-                <a:spcPts val="0"/>
-              </a:spcBef>
-              <a:spcAft>
-                <a:spcPts val="1000"/>
-              </a:spcAft>
-            </a:pPr>
-            <a:r>
-              <a:rPr lang="en-US" sz="2000" b="1" dirty="0" smtClean="0">
-                <a:effectLst/>
-                <a:ea typeface="Calibri"/>
-              </a:rPr>
-              <a:t>Pop 9</a:t>
-            </a:r>
-            <a:endParaRPr lang="en-US" sz="1200" dirty="0">
-              <a:effectLst/>
-              <a:latin typeface="Times New Roman"/>
-              <a:ea typeface="ＭＳ 明朝"/>
-            </a:endParaRPr>
-          </a:p>
-        </p:txBody>
-      </p:sp>
-      <p:cxnSp>
-        <p:nvCxnSpPr>
-          <p:cNvPr id="18" name="Straight Connector 17"/>
-          <p:cNvCxnSpPr>
-            <a:stCxn id="8" idx="3"/>
-            <a:endCxn id="5" idx="0"/>
-          </p:cNvCxnSpPr>
-          <p:nvPr/>
-        </p:nvCxnSpPr>
-        <p:spPr>
-          <a:xfrm flipV="1">
-            <a:off x="1614823" y="5811421"/>
-            <a:ext cx="2957177" cy="365225"/>
-          </a:xfrm>
-          <a:prstGeom prst="line">
-            <a:avLst/>
-          </a:prstGeom>
-          <a:ln>
-            <a:solidFill>
-              <a:srgbClr val="000000"/>
-            </a:solidFill>
-          </a:ln>
-        </p:spPr>
-        <p:style>
-          <a:lnRef idx="2">
-            <a:schemeClr val="accent1"/>
-          </a:lnRef>
-          <a:fillRef idx="0">
-            <a:schemeClr val="accent1"/>
-          </a:fillRef>
-          <a:effectRef idx="1">
-            <a:schemeClr val="accent1"/>
-          </a:effectRef>
-          <a:fontRef idx="minor">
-            <a:schemeClr val="tx1"/>
-          </a:fontRef>
-        </p:style>
-      </p:cxnSp>
-      <p:cxnSp>
-        <p:nvCxnSpPr>
-          <p:cNvPr id="21" name="Straight Connector 20"/>
-          <p:cNvCxnSpPr>
-            <a:stCxn id="7" idx="3"/>
-            <a:endCxn id="5" idx="0"/>
-          </p:cNvCxnSpPr>
-          <p:nvPr/>
-        </p:nvCxnSpPr>
-        <p:spPr>
-          <a:xfrm>
-            <a:off x="1065675" y="4496813"/>
-            <a:ext cx="3506325" cy="1314608"/>
-          </a:xfrm>
-          <a:prstGeom prst="line">
-            <a:avLst/>
-          </a:prstGeom>
-          <a:ln>
-            <a:solidFill>
-              <a:srgbClr val="000000"/>
-            </a:solidFill>
-          </a:ln>
-        </p:spPr>
-        <p:style>
-          <a:lnRef idx="2">
-            <a:schemeClr val="accent1"/>
-          </a:lnRef>
-          <a:fillRef idx="0">
-            <a:schemeClr val="accent1"/>
-          </a:fillRef>
-          <a:effectRef idx="1">
-            <a:schemeClr val="accent1"/>
-          </a:effectRef>
-          <a:fontRef idx="minor">
-            <a:schemeClr val="tx1"/>
-          </a:fontRef>
-        </p:style>
-      </p:cxnSp>
-      <p:cxnSp>
-        <p:nvCxnSpPr>
-          <p:cNvPr id="24" name="Straight Connector 23"/>
-          <p:cNvCxnSpPr>
-            <a:stCxn id="9" idx="3"/>
-            <a:endCxn id="5" idx="0"/>
-          </p:cNvCxnSpPr>
-          <p:nvPr/>
-        </p:nvCxnSpPr>
-        <p:spPr>
-          <a:xfrm>
-            <a:off x="1462423" y="3261797"/>
-            <a:ext cx="3109577" cy="2549624"/>
-          </a:xfrm>
-          <a:prstGeom prst="line">
-            <a:avLst/>
-          </a:prstGeom>
-          <a:ln>
-            <a:solidFill>
-              <a:srgbClr val="000000"/>
-            </a:solidFill>
-          </a:ln>
-        </p:spPr>
-        <p:style>
-          <a:lnRef idx="2">
-            <a:schemeClr val="accent1"/>
-          </a:lnRef>
-          <a:fillRef idx="0">
-            <a:schemeClr val="accent1"/>
-          </a:fillRef>
-          <a:effectRef idx="1">
-            <a:schemeClr val="accent1"/>
-          </a:effectRef>
-          <a:fontRef idx="minor">
-            <a:schemeClr val="tx1"/>
-          </a:fontRef>
-        </p:style>
-      </p:cxnSp>
-      <p:cxnSp>
-        <p:nvCxnSpPr>
-          <p:cNvPr id="27" name="Straight Connector 26"/>
-          <p:cNvCxnSpPr>
-            <a:stCxn id="10" idx="3"/>
-            <a:endCxn id="5" idx="0"/>
-          </p:cNvCxnSpPr>
-          <p:nvPr/>
-        </p:nvCxnSpPr>
-        <p:spPr>
-          <a:xfrm>
-            <a:off x="1859172" y="2167096"/>
-            <a:ext cx="2712828" cy="3644325"/>
-          </a:xfrm>
-          <a:prstGeom prst="line">
-            <a:avLst/>
-          </a:prstGeom>
-          <a:ln>
-            <a:solidFill>
-              <a:srgbClr val="000000"/>
-            </a:solidFill>
-          </a:ln>
-        </p:spPr>
-        <p:style>
-          <a:lnRef idx="2">
-            <a:schemeClr val="accent1"/>
-          </a:lnRef>
-          <a:fillRef idx="0">
-            <a:schemeClr val="accent1"/>
-          </a:fillRef>
-          <a:effectRef idx="1">
-            <a:schemeClr val="accent1"/>
-          </a:effectRef>
-          <a:fontRef idx="minor">
-            <a:schemeClr val="tx1"/>
-          </a:fontRef>
-        </p:style>
-      </p:cxnSp>
-      <p:cxnSp>
-        <p:nvCxnSpPr>
-          <p:cNvPr id="30" name="Straight Connector 29"/>
-          <p:cNvCxnSpPr>
-            <a:stCxn id="11" idx="2"/>
-            <a:endCxn id="5" idx="0"/>
-          </p:cNvCxnSpPr>
-          <p:nvPr/>
-        </p:nvCxnSpPr>
-        <p:spPr>
-          <a:xfrm>
-            <a:off x="2884869" y="1399985"/>
-            <a:ext cx="1687131" cy="4411436"/>
-          </a:xfrm>
-          <a:prstGeom prst="line">
-            <a:avLst/>
-          </a:prstGeom>
-          <a:ln>
-            <a:solidFill>
-              <a:srgbClr val="000000"/>
-            </a:solidFill>
-          </a:ln>
-        </p:spPr>
-        <p:style>
-          <a:lnRef idx="2">
-            <a:schemeClr val="accent1"/>
-          </a:lnRef>
-          <a:fillRef idx="0">
-            <a:schemeClr val="accent1"/>
-          </a:fillRef>
-          <a:effectRef idx="1">
-            <a:schemeClr val="accent1"/>
-          </a:effectRef>
-          <a:fontRef idx="minor">
-            <a:schemeClr val="tx1"/>
-          </a:fontRef>
-        </p:style>
-      </p:cxnSp>
-      <p:cxnSp>
-        <p:nvCxnSpPr>
-          <p:cNvPr id="33" name="Straight Connector 32"/>
-          <p:cNvCxnSpPr>
-            <a:stCxn id="12" idx="2"/>
-            <a:endCxn id="5" idx="0"/>
-          </p:cNvCxnSpPr>
-          <p:nvPr/>
-        </p:nvCxnSpPr>
-        <p:spPr>
-          <a:xfrm>
-            <a:off x="4534003" y="1399985"/>
-            <a:ext cx="37997" cy="4411436"/>
-          </a:xfrm>
-          <a:prstGeom prst="line">
-            <a:avLst/>
-          </a:prstGeom>
-          <a:ln>
-            <a:solidFill>
-              <a:srgbClr val="000000"/>
-            </a:solidFill>
-          </a:ln>
-        </p:spPr>
-        <p:style>
-          <a:lnRef idx="2">
-            <a:schemeClr val="accent1"/>
-          </a:lnRef>
-          <a:fillRef idx="0">
-            <a:schemeClr val="accent1"/>
-          </a:fillRef>
-          <a:effectRef idx="1">
-            <a:schemeClr val="accent1"/>
-          </a:effectRef>
-          <a:fontRef idx="minor">
-            <a:schemeClr val="tx1"/>
-          </a:fontRef>
-        </p:style>
-      </p:cxnSp>
-      <p:cxnSp>
-        <p:nvCxnSpPr>
-          <p:cNvPr id="36" name="Straight Connector 35"/>
-          <p:cNvCxnSpPr>
-            <a:stCxn id="13" idx="2"/>
-            <a:endCxn id="5" idx="0"/>
-          </p:cNvCxnSpPr>
-          <p:nvPr/>
-        </p:nvCxnSpPr>
-        <p:spPr>
-          <a:xfrm flipH="1">
-            <a:off x="4572000" y="1399985"/>
-            <a:ext cx="1676428" cy="4411436"/>
-          </a:xfrm>
-          <a:prstGeom prst="line">
-            <a:avLst/>
-          </a:prstGeom>
-          <a:ln>
-            <a:solidFill>
-              <a:srgbClr val="000000"/>
-            </a:solidFill>
-          </a:ln>
-        </p:spPr>
-        <p:style>
-          <a:lnRef idx="2">
-            <a:schemeClr val="accent1"/>
-          </a:lnRef>
-          <a:fillRef idx="0">
-            <a:schemeClr val="accent1"/>
-          </a:fillRef>
-          <a:effectRef idx="1">
-            <a:schemeClr val="accent1"/>
-          </a:effectRef>
-          <a:fontRef idx="minor">
-            <a:schemeClr val="tx1"/>
-          </a:fontRef>
-        </p:style>
-      </p:cxnSp>
-      <p:cxnSp>
-        <p:nvCxnSpPr>
-          <p:cNvPr id="39" name="Straight Connector 38"/>
-          <p:cNvCxnSpPr>
-            <a:stCxn id="14" idx="1"/>
-            <a:endCxn id="5" idx="0"/>
-          </p:cNvCxnSpPr>
-          <p:nvPr/>
-        </p:nvCxnSpPr>
-        <p:spPr>
-          <a:xfrm flipH="1">
-            <a:off x="4572000" y="2167096"/>
-            <a:ext cx="2609835" cy="3644325"/>
-          </a:xfrm>
-          <a:prstGeom prst="line">
-            <a:avLst/>
-          </a:prstGeom>
-          <a:ln>
-            <a:solidFill>
-              <a:srgbClr val="000000"/>
-            </a:solidFill>
-          </a:ln>
-        </p:spPr>
-        <p:style>
-          <a:lnRef idx="2">
-            <a:schemeClr val="accent1"/>
-          </a:lnRef>
-          <a:fillRef idx="0">
-            <a:schemeClr val="accent1"/>
-          </a:fillRef>
-          <a:effectRef idx="1">
-            <a:schemeClr val="accent1"/>
-          </a:effectRef>
-          <a:fontRef idx="minor">
-            <a:schemeClr val="tx1"/>
-          </a:fontRef>
-        </p:style>
-      </p:cxnSp>
-      <p:cxnSp>
-        <p:nvCxnSpPr>
-          <p:cNvPr id="42" name="Straight Connector 41"/>
-          <p:cNvCxnSpPr>
-            <a:stCxn id="15" idx="1"/>
-            <a:endCxn id="6" idx="0"/>
-          </p:cNvCxnSpPr>
-          <p:nvPr/>
-        </p:nvCxnSpPr>
-        <p:spPr>
-          <a:xfrm flipH="1">
-            <a:off x="4582476" y="3261797"/>
-            <a:ext cx="2996107" cy="2567546"/>
-          </a:xfrm>
-          <a:prstGeom prst="line">
-            <a:avLst/>
-          </a:prstGeom>
-          <a:ln>
-            <a:solidFill>
-              <a:srgbClr val="000000"/>
-            </a:solidFill>
-          </a:ln>
-        </p:spPr>
-        <p:style>
-          <a:lnRef idx="2">
-            <a:schemeClr val="accent1"/>
-          </a:lnRef>
-          <a:fillRef idx="0">
-            <a:schemeClr val="accent1"/>
-          </a:fillRef>
-          <a:effectRef idx="1">
-            <a:schemeClr val="accent1"/>
-          </a:effectRef>
-          <a:fontRef idx="minor">
-            <a:schemeClr val="tx1"/>
-          </a:fontRef>
-        </p:style>
-      </p:cxnSp>
-      <p:cxnSp>
-        <p:nvCxnSpPr>
-          <p:cNvPr id="45" name="Straight Connector 44"/>
-          <p:cNvCxnSpPr>
-            <a:stCxn id="16" idx="1"/>
-            <a:endCxn id="5" idx="0"/>
-          </p:cNvCxnSpPr>
-          <p:nvPr/>
-        </p:nvCxnSpPr>
-        <p:spPr>
-          <a:xfrm flipH="1">
-            <a:off x="4572000" y="4496813"/>
-            <a:ext cx="3403331" cy="1314608"/>
-          </a:xfrm>
-          <a:prstGeom prst="line">
-            <a:avLst/>
-          </a:prstGeom>
-          <a:ln>
-            <a:solidFill>
-              <a:srgbClr val="000000"/>
-            </a:solidFill>
-          </a:ln>
-        </p:spPr>
-        <p:style>
-          <a:lnRef idx="2">
-            <a:schemeClr val="accent1"/>
-          </a:lnRef>
-          <a:fillRef idx="0">
-            <a:schemeClr val="accent1"/>
-          </a:fillRef>
-          <a:effectRef idx="1">
-            <a:schemeClr val="accent1"/>
-          </a:effectRef>
-          <a:fontRef idx="minor">
-            <a:schemeClr val="tx1"/>
-          </a:fontRef>
-        </p:style>
-      </p:cxnSp>
     </p:spTree>
     <p:extLst>
       <p:ext uri="{BB962C8B-B14F-4D97-AF65-F5344CB8AC3E}">

</xml_diff>

<commit_message>
Added everything related to the branching model simulations.
</commit_message>
<xml_diff>
--- a/PatchOccupancy_Sims/SimulationModel.pptx
+++ b/PatchOccupancy_Sims/SimulationModel.pptx
@@ -288,7 +288,7 @@
           <a:p>
             <a:fld id="{552F5AA2-ADCD-3343-B85F-BC95CDA5238C}" type="datetimeFigureOut">
               <a:rPr lang="en-US" smtClean="0"/>
-              <a:t>9/13/16</a:t>
+              <a:t>11/1/16</a:t>
             </a:fld>
             <a:endParaRPr lang="en-US"/>
           </a:p>
@@ -458,7 +458,7 @@
           <a:p>
             <a:fld id="{552F5AA2-ADCD-3343-B85F-BC95CDA5238C}" type="datetimeFigureOut">
               <a:rPr lang="en-US" smtClean="0"/>
-              <a:t>9/13/16</a:t>
+              <a:t>11/1/16</a:t>
             </a:fld>
             <a:endParaRPr lang="en-US"/>
           </a:p>
@@ -638,7 +638,7 @@
           <a:p>
             <a:fld id="{552F5AA2-ADCD-3343-B85F-BC95CDA5238C}" type="datetimeFigureOut">
               <a:rPr lang="en-US" smtClean="0"/>
-              <a:t>9/13/16</a:t>
+              <a:t>11/1/16</a:t>
             </a:fld>
             <a:endParaRPr lang="en-US"/>
           </a:p>
@@ -808,7 +808,7 @@
           <a:p>
             <a:fld id="{552F5AA2-ADCD-3343-B85F-BC95CDA5238C}" type="datetimeFigureOut">
               <a:rPr lang="en-US" smtClean="0"/>
-              <a:t>9/13/16</a:t>
+              <a:t>11/1/16</a:t>
             </a:fld>
             <a:endParaRPr lang="en-US"/>
           </a:p>
@@ -1054,7 +1054,7 @@
           <a:p>
             <a:fld id="{552F5AA2-ADCD-3343-B85F-BC95CDA5238C}" type="datetimeFigureOut">
               <a:rPr lang="en-US" smtClean="0"/>
-              <a:t>9/13/16</a:t>
+              <a:t>11/1/16</a:t>
             </a:fld>
             <a:endParaRPr lang="en-US"/>
           </a:p>
@@ -1342,7 +1342,7 @@
           <a:p>
             <a:fld id="{552F5AA2-ADCD-3343-B85F-BC95CDA5238C}" type="datetimeFigureOut">
               <a:rPr lang="en-US" smtClean="0"/>
-              <a:t>9/13/16</a:t>
+              <a:t>11/1/16</a:t>
             </a:fld>
             <a:endParaRPr lang="en-US"/>
           </a:p>
@@ -1764,7 +1764,7 @@
           <a:p>
             <a:fld id="{552F5AA2-ADCD-3343-B85F-BC95CDA5238C}" type="datetimeFigureOut">
               <a:rPr lang="en-US" smtClean="0"/>
-              <a:t>9/13/16</a:t>
+              <a:t>11/1/16</a:t>
             </a:fld>
             <a:endParaRPr lang="en-US"/>
           </a:p>
@@ -1882,7 +1882,7 @@
           <a:p>
             <a:fld id="{552F5AA2-ADCD-3343-B85F-BC95CDA5238C}" type="datetimeFigureOut">
               <a:rPr lang="en-US" smtClean="0"/>
-              <a:t>9/13/16</a:t>
+              <a:t>11/1/16</a:t>
             </a:fld>
             <a:endParaRPr lang="en-US"/>
           </a:p>
@@ -1977,7 +1977,7 @@
           <a:p>
             <a:fld id="{552F5AA2-ADCD-3343-B85F-BC95CDA5238C}" type="datetimeFigureOut">
               <a:rPr lang="en-US" smtClean="0"/>
-              <a:t>9/13/16</a:t>
+              <a:t>11/1/16</a:t>
             </a:fld>
             <a:endParaRPr lang="en-US"/>
           </a:p>
@@ -2254,7 +2254,7 @@
           <a:p>
             <a:fld id="{552F5AA2-ADCD-3343-B85F-BC95CDA5238C}" type="datetimeFigureOut">
               <a:rPr lang="en-US" smtClean="0"/>
-              <a:t>9/13/16</a:t>
+              <a:t>11/1/16</a:t>
             </a:fld>
             <a:endParaRPr lang="en-US"/>
           </a:p>
@@ -2507,7 +2507,7 @@
           <a:p>
             <a:fld id="{552F5AA2-ADCD-3343-B85F-BC95CDA5238C}" type="datetimeFigureOut">
               <a:rPr lang="en-US" smtClean="0"/>
-              <a:t>9/13/16</a:t>
+              <a:t>11/1/16</a:t>
             </a:fld>
             <a:endParaRPr lang="en-US"/>
           </a:p>
@@ -2720,7 +2720,7 @@
           <a:p>
             <a:fld id="{552F5AA2-ADCD-3343-B85F-BC95CDA5238C}" type="datetimeFigureOut">
               <a:rPr lang="en-US" smtClean="0"/>
-              <a:t>9/13/16</a:t>
+              <a:t>11/1/16</a:t>
             </a:fld>
             <a:endParaRPr lang="en-US"/>
           </a:p>
@@ -3142,7 +3142,7 @@
         </p:nvSpPr>
         <p:spPr>
           <a:xfrm>
-            <a:off x="362382" y="4314630"/>
+            <a:off x="1157690" y="1527387"/>
             <a:ext cx="872847" cy="883845"/>
           </a:xfrm>
           <a:prstGeom prst="rect">
@@ -3199,7 +3199,14 @@
                 <a:effectLst/>
                 <a:ea typeface="Calibri"/>
               </a:rPr>
-              <a:t>Pop 1</a:t>
+              <a:t>Pop </a:t>
+            </a:r>
+            <a:r>
+              <a:rPr lang="en-US" sz="2000" b="1" dirty="0" smtClean="0">
+                <a:effectLst/>
+                <a:ea typeface="Calibri"/>
+              </a:rPr>
+              <a:t>4</a:t>
             </a:r>
             <a:endParaRPr lang="en-US" sz="1200" dirty="0">
               <a:effectLst/>
@@ -3282,7 +3289,7 @@
         </p:nvSpPr>
         <p:spPr>
           <a:xfrm>
-            <a:off x="737783" y="3445243"/>
+            <a:off x="543093" y="4911416"/>
             <a:ext cx="655783" cy="498906"/>
           </a:xfrm>
           <a:prstGeom prst="rect">
@@ -3339,7 +3346,14 @@
                 <a:effectLst/>
                 <a:ea typeface="Calibri"/>
               </a:rPr>
-              <a:t>Pop 2</a:t>
+              <a:t>Pop </a:t>
+            </a:r>
+            <a:r>
+              <a:rPr lang="en-US" sz="2000" b="1" dirty="0" smtClean="0">
+                <a:effectLst/>
+                <a:ea typeface="Calibri"/>
+              </a:rPr>
+              <a:t>1</a:t>
             </a:r>
             <a:endParaRPr lang="en-US" sz="1200" dirty="0">
               <a:effectLst/>
@@ -3357,7 +3371,7 @@
         </p:nvSpPr>
         <p:spPr>
           <a:xfrm>
-            <a:off x="543093" y="1628536"/>
+            <a:off x="5033244" y="1044600"/>
             <a:ext cx="1405730" cy="1423439"/>
           </a:xfrm>
           <a:prstGeom prst="rect">
@@ -3414,7 +3428,14 @@
                 <a:effectLst/>
                 <a:ea typeface="Calibri"/>
               </a:rPr>
-              <a:t>Pop 3</a:t>
+              <a:t>Pop </a:t>
+            </a:r>
+            <a:r>
+              <a:rPr lang="en-US" sz="2000" b="1" dirty="0" smtClean="0">
+                <a:effectLst/>
+                <a:ea typeface="Calibri"/>
+              </a:rPr>
+              <a:t>7</a:t>
             </a:r>
             <a:endParaRPr lang="en-US" sz="1200" dirty="0">
               <a:effectLst/>
@@ -3473,8 +3494,8 @@
         </p:nvCxnSpPr>
         <p:spPr>
           <a:xfrm>
-            <a:off x="1235229" y="4756553"/>
-            <a:ext cx="3322340" cy="624905"/>
+            <a:off x="2030537" y="1969310"/>
+            <a:ext cx="2527032" cy="3412148"/>
           </a:xfrm>
           <a:prstGeom prst="line">
             <a:avLst/>
@@ -3511,8 +3532,8 @@
         </p:nvCxnSpPr>
         <p:spPr>
           <a:xfrm>
-            <a:off x="1393566" y="3694696"/>
-            <a:ext cx="3164003" cy="1686762"/>
+            <a:off x="1198876" y="5160869"/>
+            <a:ext cx="3358693" cy="220589"/>
           </a:xfrm>
           <a:prstGeom prst="line">
             <a:avLst/>
@@ -3542,15 +3563,15 @@
         <p:nvCxnSpPr>
           <p:cNvPr id="27" name="Straight Connector 26"/>
           <p:cNvCxnSpPr>
-            <a:stCxn id="10" idx="3"/>
+            <a:stCxn id="10" idx="2"/>
             <a:endCxn id="5" idx="0"/>
           </p:cNvCxnSpPr>
           <p:nvPr/>
         </p:nvCxnSpPr>
         <p:spPr>
-          <a:xfrm>
-            <a:off x="1948823" y="2340256"/>
-            <a:ext cx="2608746" cy="3041202"/>
+          <a:xfrm flipH="1">
+            <a:off x="4557569" y="2468039"/>
+            <a:ext cx="1178540" cy="2913419"/>
           </a:xfrm>
           <a:prstGeom prst="line">
             <a:avLst/>
@@ -3587,8 +3608,8 @@
         </p:nvCxnSpPr>
         <p:spPr>
           <a:xfrm>
-            <a:off x="2466492" y="1323493"/>
-            <a:ext cx="2091077" cy="4057965"/>
+            <a:off x="4328604" y="1323493"/>
+            <a:ext cx="228965" cy="4057965"/>
           </a:xfrm>
           <a:prstGeom prst="line">
             <a:avLst/>
@@ -3625,8 +3646,8 @@
         </p:nvCxnSpPr>
         <p:spPr>
           <a:xfrm>
-            <a:off x="3938153" y="891381"/>
-            <a:ext cx="619416" cy="4490077"/>
+            <a:off x="1220946" y="3590378"/>
+            <a:ext cx="3336623" cy="1791080"/>
           </a:xfrm>
           <a:prstGeom prst="line">
             <a:avLst/>
@@ -3656,15 +3677,15 @@
         <p:nvCxnSpPr>
           <p:cNvPr id="36" name="Straight Connector 35"/>
           <p:cNvCxnSpPr>
-            <a:stCxn id="64" idx="3"/>
+            <a:stCxn id="64" idx="1"/>
             <a:endCxn id="5" idx="0"/>
           </p:cNvCxnSpPr>
           <p:nvPr/>
         </p:nvCxnSpPr>
         <p:spPr>
           <a:xfrm flipH="1">
-            <a:off x="4557569" y="1709762"/>
-            <a:ext cx="994909" cy="3671696"/>
+            <a:off x="4557569" y="5160869"/>
+            <a:ext cx="2857696" cy="220589"/>
           </a:xfrm>
           <a:prstGeom prst="line">
             <a:avLst/>
@@ -3694,15 +3715,15 @@
         <p:nvCxnSpPr>
           <p:cNvPr id="39" name="Straight Connector 38"/>
           <p:cNvCxnSpPr>
-            <a:stCxn id="66" idx="2"/>
+            <a:stCxn id="66" idx="4"/>
             <a:endCxn id="5" idx="0"/>
           </p:cNvCxnSpPr>
           <p:nvPr/>
         </p:nvCxnSpPr>
         <p:spPr>
-          <a:xfrm flipH="1">
-            <a:off x="4557569" y="2936259"/>
-            <a:ext cx="2736133" cy="2445199"/>
+          <a:xfrm>
+            <a:off x="2851454" y="1643962"/>
+            <a:ext cx="1706115" cy="3737496"/>
           </a:xfrm>
           <a:prstGeom prst="line">
             <a:avLst/>
@@ -3738,9 +3759,9 @@
           <p:nvPr/>
         </p:nvCxnSpPr>
         <p:spPr>
-          <a:xfrm flipH="1">
-            <a:off x="4571512" y="4163531"/>
-            <a:ext cx="3007071" cy="1246791"/>
+          <a:xfrm>
+            <a:off x="586887" y="4280323"/>
+            <a:ext cx="3984625" cy="1129999"/>
           </a:xfrm>
           <a:prstGeom prst="line">
             <a:avLst/>
@@ -3770,15 +3791,15 @@
         <p:nvCxnSpPr>
           <p:cNvPr id="45" name="Straight Connector 44"/>
           <p:cNvCxnSpPr>
-            <a:stCxn id="70" idx="2"/>
+            <a:stCxn id="70" idx="3"/>
             <a:endCxn id="5" idx="0"/>
           </p:cNvCxnSpPr>
           <p:nvPr/>
         </p:nvCxnSpPr>
         <p:spPr>
-          <a:xfrm flipH="1" flipV="1">
-            <a:off x="4557569" y="5381458"/>
-            <a:ext cx="2705705" cy="240895"/>
+          <a:xfrm flipH="1">
+            <a:off x="4557569" y="4018363"/>
+            <a:ext cx="2097873" cy="1363095"/>
           </a:xfrm>
           <a:prstGeom prst="line">
             <a:avLst/>
@@ -3812,7 +3833,7 @@
         </p:nvSpPr>
         <p:spPr>
           <a:xfrm>
-            <a:off x="1870642" y="314207"/>
+            <a:off x="3732754" y="314207"/>
             <a:ext cx="1191700" cy="1009286"/>
           </a:xfrm>
           <a:prstGeom prst="triangle">
@@ -3868,7 +3889,16 @@
                 </a:solidFill>
                 <a:ea typeface="Calibri"/>
               </a:rPr>
-              <a:t>Pop 4</a:t>
+              <a:t>Pop </a:t>
+            </a:r>
+            <a:r>
+              <a:rPr lang="en-US" sz="2000" b="1" dirty="0" smtClean="0">
+                <a:solidFill>
+                  <a:schemeClr val="dk1"/>
+                </a:solidFill>
+                <a:ea typeface="Calibri"/>
+              </a:rPr>
+              <a:t>6</a:t>
             </a:r>
             <a:endParaRPr lang="en-US" sz="2000" b="1" dirty="0">
               <a:solidFill>
@@ -3887,7 +3917,7 @@
         </p:nvSpPr>
         <p:spPr>
           <a:xfrm>
-            <a:off x="3342303" y="463346"/>
+            <a:off x="625096" y="3162343"/>
             <a:ext cx="1191700" cy="428035"/>
           </a:xfrm>
           <a:prstGeom prst="triangle">
@@ -3943,10 +3973,10 @@
               <a:t>Pop </a:t>
             </a:r>
             <a:r>
-              <a:rPr lang="en-US" sz="2000" b="1" dirty="0" smtClean="0">
+              <a:rPr lang="en-US" sz="2000" b="1" dirty="0">
                 <a:ea typeface="Calibri"/>
               </a:rPr>
-              <a:t>5</a:t>
+              <a:t>3</a:t>
             </a:r>
             <a:endParaRPr lang="en-US" sz="2000" b="1" dirty="0">
               <a:ea typeface="Calibri"/>
@@ -3962,7 +3992,7 @@
         </p:nvSpPr>
         <p:spPr>
           <a:xfrm>
-            <a:off x="4592855" y="84295"/>
+            <a:off x="6935454" y="4348135"/>
             <a:ext cx="1919245" cy="1625467"/>
           </a:xfrm>
           <a:prstGeom prst="triangle">
@@ -4015,8 +4045,17 @@
               <a:rPr lang="en-US" sz="2000" b="1" dirty="0">
                 <a:ea typeface="Calibri"/>
               </a:rPr>
-              <a:t>Pop 6</a:t>
-            </a:r>
+              <a:t>Pop </a:t>
+            </a:r>
+            <a:r>
+              <a:rPr lang="en-US" sz="2000" b="1" dirty="0" smtClean="0">
+                <a:ea typeface="Calibri"/>
+              </a:rPr>
+              <a:t>9</a:t>
+            </a:r>
+            <a:endParaRPr lang="en-US" sz="2000" b="1" dirty="0">
+              <a:ea typeface="Calibri"/>
+            </a:endParaRPr>
           </a:p>
         </p:txBody>
       </p:sp>
@@ -4028,7 +4067,7 @@
         </p:nvSpPr>
         <p:spPr>
           <a:xfrm>
-            <a:off x="7293702" y="2403382"/>
+            <a:off x="2286491" y="578208"/>
             <a:ext cx="1129926" cy="1065754"/>
           </a:xfrm>
           <a:prstGeom prst="ellipse">
@@ -4084,7 +4123,16 @@
                 </a:solidFill>
                 <a:ea typeface="Calibri"/>
               </a:rPr>
-              <a:t>Pop 7</a:t>
+              <a:t>Pop </a:t>
+            </a:r>
+            <a:r>
+              <a:rPr lang="en-US" sz="2000" b="1" dirty="0" smtClean="0">
+                <a:solidFill>
+                  <a:schemeClr val="dk1"/>
+                </a:solidFill>
+                <a:ea typeface="Calibri"/>
+              </a:rPr>
+              <a:t>5</a:t>
             </a:r>
             <a:endParaRPr lang="en-US" sz="2000" b="1" dirty="0">
               <a:solidFill>
@@ -4103,7 +4151,7 @@
         </p:nvSpPr>
         <p:spPr>
           <a:xfrm>
-            <a:off x="7578583" y="3799569"/>
+            <a:off x="586887" y="3916361"/>
             <a:ext cx="771755" cy="727924"/>
           </a:xfrm>
           <a:prstGeom prst="ellipse">
@@ -4159,10 +4207,10 @@
               <a:t>Pop </a:t>
             </a:r>
             <a:r>
-              <a:rPr lang="en-US" sz="2000" b="1" dirty="0" smtClean="0">
+              <a:rPr lang="en-US" sz="2000" b="1" dirty="0">
                 <a:ea typeface="Calibri"/>
               </a:rPr>
-              <a:t>8</a:t>
+              <a:t>2</a:t>
             </a:r>
             <a:endParaRPr lang="en-US" sz="2000" b="1" dirty="0">
               <a:ea typeface="Calibri"/>
@@ -4178,7 +4226,7 @@
         </p:nvSpPr>
         <p:spPr>
           <a:xfrm>
-            <a:off x="7263274" y="4727965"/>
+            <a:off x="6380016" y="2491548"/>
             <a:ext cx="1880726" cy="1788775"/>
           </a:xfrm>
           <a:prstGeom prst="ellipse">
@@ -4231,8 +4279,17 @@
               <a:rPr lang="en-US" sz="2000" b="1" dirty="0">
                 <a:ea typeface="Calibri"/>
               </a:rPr>
-              <a:t>Pop 9</a:t>
-            </a:r>
+              <a:t>Pop </a:t>
+            </a:r>
+            <a:r>
+              <a:rPr lang="en-US" sz="2000" b="1" dirty="0" smtClean="0">
+                <a:ea typeface="Calibri"/>
+              </a:rPr>
+              <a:t>8</a:t>
+            </a:r>
+            <a:endParaRPr lang="en-US" sz="2000" b="1" dirty="0">
+              <a:ea typeface="Calibri"/>
+            </a:endParaRPr>
           </a:p>
         </p:txBody>
       </p:sp>
@@ -4244,7 +4301,7 @@
         </p:nvSpPr>
         <p:spPr>
           <a:xfrm>
-            <a:off x="7193260" y="897029"/>
+            <a:off x="7193260" y="1378796"/>
             <a:ext cx="345194" cy="321589"/>
           </a:xfrm>
           <a:prstGeom prst="triangle">
@@ -4383,7 +4440,11 @@
           <a:p>
             <a:r>
               <a:rPr lang="en-US" dirty="0" smtClean="0"/>
-              <a:t>High / High</a:t>
+              <a:t>Low/ </a:t>
+            </a:r>
+            <a:r>
+              <a:rPr lang="en-US" dirty="0" smtClean="0"/>
+              <a:t>High</a:t>
             </a:r>
             <a:endParaRPr lang="en-US" dirty="0"/>
           </a:p>
@@ -4413,7 +4474,11 @@
           <a:p>
             <a:r>
               <a:rPr lang="en-US" dirty="0" smtClean="0"/>
-              <a:t>Low / High</a:t>
+              <a:t>High/ </a:t>
+            </a:r>
+            <a:r>
+              <a:rPr lang="en-US" dirty="0" smtClean="0"/>
+              <a:t>High</a:t>
             </a:r>
             <a:endParaRPr lang="en-US" dirty="0"/>
           </a:p>
@@ -4490,7 +4555,7 @@
         </p:nvSpPr>
         <p:spPr>
           <a:xfrm>
-            <a:off x="7207691" y="1354366"/>
+            <a:off x="7207691" y="945594"/>
             <a:ext cx="313933" cy="289596"/>
           </a:xfrm>
           <a:prstGeom prst="ellipse">

</xml_diff>